<commit_message>
updated with new code structure
</commit_message>
<xml_diff>
--- a/GUI_powerpoint.pptx
+++ b/GUI_powerpoint.pptx
@@ -420,7 +420,7 @@
           </a:bodyPr>
           <a:p>
             <a:pPr algn="r"/>
-            <a:fld id="{656CFFD1-1C8B-4EAC-8821-E3AC9407A32B}" type="slidenum">
+            <a:fld id="{F1790125-59E2-4919-A490-315E55B8C17D}" type="slidenum">
               <a:rPr b="0" lang="en-GB" sz="1400" spc="-1" strike="noStrike">
                 <a:latin typeface="Times New Roman"/>
               </a:rPr>
@@ -457,7 +457,7 @@
       </p:grpSpPr>
       <p:sp>
         <p:nvSpPr>
-          <p:cNvPr id="493" name="PlaceHolder 1"/>
+          <p:cNvPr id="498" name="PlaceHolder 1"/>
           <p:cNvSpPr>
             <a:spLocks noGrp="1"/>
           </p:cNvSpPr>
@@ -477,7 +477,7 @@
       </p:sp>
       <p:sp>
         <p:nvSpPr>
-          <p:cNvPr id="494" name="PlaceHolder 2"/>
+          <p:cNvPr id="499" name="PlaceHolder 2"/>
           <p:cNvSpPr>
             <a:spLocks noGrp="1"/>
           </p:cNvSpPr>
@@ -507,7 +507,7 @@
       </p:sp>
       <p:sp>
         <p:nvSpPr>
-          <p:cNvPr id="495" name="TextShape 3"/>
+          <p:cNvPr id="500" name="TextShape 3"/>
           <p:cNvSpPr txBox="1"/>
           <p:nvPr/>
         </p:nvSpPr>
@@ -534,11 +534,11 @@
                 <a:spcPct val="100000"/>
               </a:lnSpc>
             </a:pPr>
-            <a:fld id="{DC5F6F78-9F94-4B09-8DDA-7AB686193346}" type="slidenum">
+            <a:fld id="{206BAB06-2063-40B2-94AF-B6FB90392AFE}" type="slidenum">
               <a:rPr b="0" lang="en-GB" sz="1200" spc="-1" strike="noStrike">
                 <a:latin typeface="Times New Roman"/>
               </a:rPr>
-              <a:t>&lt;number&gt;</a:t>
+              <a:t>30</a:t>
             </a:fld>
             <a:endParaRPr b="0" lang="en-GB" sz="1200" spc="-1" strike="noStrike">
               <a:latin typeface="Times New Roman"/>
@@ -7767,17 +7767,7 @@
                 <a:latin typeface="Arial"/>
                 <a:ea typeface="Verdana"/>
               </a:rPr>
-              <a:t>New window opens displaying representation of elements in the ring (uses OPAL start </a:t>
-            </a:r>
-            <a:r>
-              <a:rPr b="0" lang="en-US" sz="1800" spc="-1" strike="noStrike">
-                <a:solidFill>
-                  <a:srgbClr val="44546a"/>
-                </a:solidFill>
-                <a:latin typeface="Arial"/>
-                <a:ea typeface="Verdana"/>
-              </a:rPr>
-              <a:t>and end positions).</a:t>
+              <a:t>New window opens displaying representation of elements in the ring (uses OPAL start and end positions).</a:t>
             </a:r>
             <a:endParaRPr b="0" lang="en-US" sz="1800" spc="-1" strike="noStrike">
               <a:solidFill>
@@ -8959,17 +8949,7 @@
                 <a:latin typeface="Arial"/>
                 <a:ea typeface="Verdana"/>
               </a:rPr>
-              <a:t>Reset </a:t>
-            </a:r>
-            <a:r>
-              <a:rPr b="0" lang="en-US" sz="2800" spc="-1" strike="noStrike">
-                <a:solidFill>
-                  <a:srgbClr val="003088"/>
-                </a:solidFill>
-                <a:latin typeface="Arial"/>
-                <a:ea typeface="Verdana"/>
-              </a:rPr>
-              <a:t>beam</a:t>
+              <a:t>Reset beam</a:t>
             </a:r>
             <a:endParaRPr b="0" lang="en-US" sz="2800" spc="-1" strike="noStrike">
               <a:solidFill>
@@ -9308,7 +9288,27 @@
                 <a:latin typeface="Arial"/>
                 <a:ea typeface="Verdana"/>
               </a:rPr>
-              <a:t>Code structure - files</a:t>
+              <a:t>Code </a:t>
+            </a:r>
+            <a:r>
+              <a:rPr b="0" lang="en-US" sz="2800" spc="-1" strike="noStrike">
+                <a:solidFill>
+                  <a:srgbClr val="003088"/>
+                </a:solidFill>
+                <a:latin typeface="Arial"/>
+                <a:ea typeface="Verdana"/>
+              </a:rPr>
+              <a:t>structure - </a:t>
+            </a:r>
+            <a:r>
+              <a:rPr b="0" lang="en-US" sz="2800" spc="-1" strike="noStrike">
+                <a:solidFill>
+                  <a:srgbClr val="003088"/>
+                </a:solidFill>
+                <a:latin typeface="Arial"/>
+                <a:ea typeface="Verdana"/>
+              </a:rPr>
+              <a:t>files</a:t>
             </a:r>
             <a:endParaRPr b="0" lang="en-US" sz="2800" spc="-1" strike="noStrike">
               <a:solidFill>
@@ -9328,7 +9328,7 @@
         <p:spPr>
           <a:xfrm>
             <a:off x="353160" y="1711080"/>
-            <a:ext cx="7743240" cy="2286360"/>
+            <a:ext cx="7743240" cy="2559960"/>
           </a:xfrm>
           <a:prstGeom prst="rect">
             <a:avLst/>
@@ -9361,7 +9361,7 @@
                 </a:solidFill>
                 <a:latin typeface="Arial"/>
               </a:rPr>
-              <a:t>4 main files:</a:t>
+              <a:t>5 main files:</a:t>
             </a:r>
             <a:endParaRPr b="0" lang="en-GB" sz="1800" spc="-1" strike="noStrike">
               <a:latin typeface="Arial"/>
@@ -9458,6 +9458,30 @@
                 <a:latin typeface="Arial"/>
               </a:rPr>
               <a:t>GUI_dicts.py: makes variable dictionaries and defines constant ones </a:t>
+            </a:r>
+            <a:endParaRPr b="0" lang="en-GB" sz="1800" spc="-1" strike="noStrike">
+              <a:latin typeface="Arial"/>
+            </a:endParaRPr>
+          </a:p>
+          <a:p>
+            <a:pPr marL="285840" indent="-285480">
+              <a:lnSpc>
+                <a:spcPct val="100000"/>
+              </a:lnSpc>
+              <a:buClr>
+                <a:srgbClr val="44546a"/>
+              </a:buClr>
+              <a:buFont typeface="Arial"/>
+              <a:buChar char="•"/>
+            </a:pPr>
+            <a:r>
+              <a:rPr b="0" lang="en-US" sz="1800" spc="-1" strike="noStrike">
+                <a:solidFill>
+                  <a:srgbClr val="44546a"/>
+                </a:solidFill>
+                <a:latin typeface="Arial"/>
+              </a:rPr>
+              <a:t>ring_display.py: contains ring display window class</a:t>
             </a:r>
             <a:endParaRPr b="0" lang="en-GB" sz="1800" spc="-1" strike="noStrike">
               <a:latin typeface="Arial"/>
@@ -9523,7 +9547,7 @@
         </p:nvSpPr>
         <p:spPr>
           <a:xfrm>
-            <a:off x="266760" y="365040"/>
+            <a:off x="290880" y="144000"/>
             <a:ext cx="5829120" cy="574200"/>
           </a:xfrm>
           <a:prstGeom prst="rect">
@@ -9571,8 +9595,8 @@
         </p:nvSpPr>
         <p:spPr>
           <a:xfrm>
-            <a:off x="3379680" y="1765440"/>
-            <a:ext cx="2368080" cy="2193120"/>
+            <a:off x="3399840" y="1378440"/>
+            <a:ext cx="2368080" cy="1906560"/>
           </a:xfrm>
           <a:prstGeom prst="rect">
             <a:avLst/>
@@ -9602,7 +9626,7 @@
         </p:nvSpPr>
         <p:spPr>
           <a:xfrm>
-            <a:off x="4222080" y="1862280"/>
+            <a:off x="4242240" y="1475280"/>
             <a:ext cx="685440" cy="366120"/>
           </a:xfrm>
           <a:prstGeom prst="rect">
@@ -9652,8 +9676,8 @@
         </p:nvSpPr>
         <p:spPr>
           <a:xfrm>
-            <a:off x="3418200" y="2169720"/>
-            <a:ext cx="2254680" cy="1796760"/>
+            <a:off x="3438360" y="1782720"/>
+            <a:ext cx="2254680" cy="1370520"/>
           </a:xfrm>
           <a:prstGeom prst="rect">
             <a:avLst/>
@@ -9692,30 +9716,6 @@
                 <a:latin typeface="Arial"/>
               </a:rPr>
               <a:t>Creates main window and widgets</a:t>
-            </a:r>
-            <a:endParaRPr b="0" lang="en-GB" sz="1400" spc="-1" strike="noStrike">
-              <a:latin typeface="Arial"/>
-            </a:endParaRPr>
-          </a:p>
-          <a:p>
-            <a:pPr marL="285840" indent="-285480">
-              <a:lnSpc>
-                <a:spcPct val="100000"/>
-              </a:lnSpc>
-              <a:buClr>
-                <a:srgbClr val="ffffff"/>
-              </a:buClr>
-              <a:buFont typeface="Arial"/>
-              <a:buChar char="•"/>
-            </a:pPr>
-            <a:r>
-              <a:rPr b="0" lang="en-US" sz="1400" spc="-1" strike="noStrike">
-                <a:solidFill>
-                  <a:srgbClr val="ffffff"/>
-                </a:solidFill>
-                <a:latin typeface="Arial"/>
-              </a:rPr>
-              <a:t>Creates ring display window</a:t>
             </a:r>
             <a:endParaRPr b="0" lang="en-GB" sz="1400" spc="-1" strike="noStrike">
               <a:latin typeface="Arial"/>
@@ -9939,8 +9939,8 @@
         </p:nvSpPr>
         <p:spPr>
           <a:xfrm>
-            <a:off x="566640" y="1774800"/>
-            <a:ext cx="2368080" cy="1553400"/>
+            <a:off x="563400" y="4491000"/>
+            <a:ext cx="2368080" cy="1080000"/>
           </a:xfrm>
           <a:prstGeom prst="rect">
             <a:avLst/>
@@ -9970,8 +9970,8 @@
         </p:nvSpPr>
         <p:spPr>
           <a:xfrm>
-            <a:off x="1293840" y="1869480"/>
-            <a:ext cx="1042920" cy="366120"/>
+            <a:off x="1290600" y="4495680"/>
+            <a:ext cx="1042920" cy="365400"/>
           </a:xfrm>
           <a:prstGeom prst="rect">
             <a:avLst/>
@@ -10020,8 +10020,8 @@
         </p:nvSpPr>
         <p:spPr>
           <a:xfrm>
-            <a:off x="623520" y="2304360"/>
-            <a:ext cx="2254680" cy="731160"/>
+            <a:off x="612720" y="4768560"/>
+            <a:ext cx="2254680" cy="730440"/>
           </a:xfrm>
           <a:prstGeom prst="rect">
             <a:avLst/>
@@ -10269,8 +10269,8 @@
         </p:nvSpPr>
         <p:spPr>
           <a:xfrm>
-            <a:off x="411840" y="1379880"/>
-            <a:ext cx="5592240" cy="4054320"/>
+            <a:off x="432000" y="992880"/>
+            <a:ext cx="5592240" cy="2652120"/>
           </a:xfrm>
           <a:prstGeom prst="rect">
             <a:avLst/>
@@ -10383,8 +10383,8 @@
         </p:nvSpPr>
         <p:spPr>
           <a:xfrm>
-            <a:off x="665640" y="3836520"/>
-            <a:ext cx="2126160" cy="819000"/>
+            <a:off x="854280" y="1377360"/>
+            <a:ext cx="2189880" cy="819000"/>
           </a:xfrm>
           <a:prstGeom prst="rect">
             <a:avLst/>
@@ -10414,8 +10414,8 @@
         </p:nvSpPr>
         <p:spPr>
           <a:xfrm>
-            <a:off x="623520" y="3933000"/>
-            <a:ext cx="2254680" cy="731160"/>
+            <a:off x="812160" y="1473840"/>
+            <a:ext cx="2376000" cy="731160"/>
           </a:xfrm>
           <a:prstGeom prst="rect">
             <a:avLst/>
@@ -10448,7 +10448,7 @@
                 </a:solidFill>
                 <a:latin typeface="Arial"/>
               </a:rPr>
-              <a:t>Also contains functions for validation and finding angle around ring</a:t>
+              <a:t>Also contains functions for validation and displaying/deleting widgets</a:t>
             </a:r>
             <a:endParaRPr b="0" lang="en-GB" sz="1400" spc="-1" strike="noStrike">
               <a:latin typeface="Arial"/>
@@ -10464,7 +10464,7 @@
         </p:nvSpPr>
         <p:spPr>
           <a:xfrm>
-            <a:off x="1833120" y="891000"/>
+            <a:off x="1853280" y="504000"/>
             <a:ext cx="2862360" cy="366120"/>
           </a:xfrm>
           <a:prstGeom prst="rect">
@@ -10514,7 +10514,7 @@
         </p:nvSpPr>
         <p:spPr>
           <a:xfrm>
-            <a:off x="3600000" y="4926600"/>
+            <a:off x="3731400" y="4969440"/>
             <a:ext cx="1042920" cy="366120"/>
           </a:xfrm>
           <a:prstGeom prst="rect">
@@ -10664,7 +10664,7 @@
         </p:nvSpPr>
         <p:spPr>
           <a:xfrm>
-            <a:off x="3440880" y="4316400"/>
+            <a:off x="846000" y="2394000"/>
             <a:ext cx="2126160" cy="819000"/>
           </a:xfrm>
           <a:prstGeom prst="rect">
@@ -10695,7 +10695,7 @@
         </p:nvSpPr>
         <p:spPr>
           <a:xfrm>
-            <a:off x="3630600" y="4551840"/>
+            <a:off x="1035720" y="2629440"/>
             <a:ext cx="1739880" cy="366120"/>
           </a:xfrm>
           <a:prstGeom prst="rect">
@@ -10736,6 +10736,254 @@
             </a:endParaRPr>
           </a:p>
         </p:txBody>
+      </p:sp>
+      <p:sp>
+        <p:nvSpPr>
+          <p:cNvPr id="263" name="CustomShape 25"/>
+          <p:cNvSpPr/>
+          <p:nvPr/>
+        </p:nvSpPr>
+        <p:spPr>
+          <a:xfrm>
+            <a:off x="2237040" y="3816000"/>
+            <a:ext cx="2862360" cy="366120"/>
+          </a:xfrm>
+          <a:prstGeom prst="rect">
+            <a:avLst/>
+          </a:prstGeom>
+          <a:noFill/>
+          <a:ln>
+            <a:noFill/>
+          </a:ln>
+        </p:spPr>
+        <p:style>
+          <a:lnRef idx="0"/>
+          <a:fillRef idx="0"/>
+          <a:effectRef idx="0"/>
+          <a:fontRef idx="minor"/>
+        </p:style>
+        <p:txBody>
+          <a:bodyPr>
+            <a:spAutoFit/>
+          </a:bodyPr>
+          <a:p>
+            <a:pPr>
+              <a:lnSpc>
+                <a:spcPct val="100000"/>
+              </a:lnSpc>
+            </a:pPr>
+            <a:r>
+              <a:rPr b="0" lang="en-US" sz="1800" spc="-1" strike="noStrike">
+                <a:solidFill>
+                  <a:srgbClr val="000000"/>
+                </a:solidFill>
+                <a:latin typeface="Arial"/>
+              </a:rPr>
+              <a:t>ring_display</a:t>
+            </a:r>
+            <a:endParaRPr b="0" lang="en-GB" sz="1800" spc="-1" strike="noStrike">
+              <a:latin typeface="Arial"/>
+            </a:endParaRPr>
+          </a:p>
+        </p:txBody>
+      </p:sp>
+      <p:sp>
+        <p:nvSpPr>
+          <p:cNvPr id="264" name="CustomShape 26"/>
+          <p:cNvSpPr/>
+          <p:nvPr/>
+        </p:nvSpPr>
+        <p:spPr>
+          <a:xfrm>
+            <a:off x="3155400" y="4275000"/>
+            <a:ext cx="2368080" cy="1248120"/>
+          </a:xfrm>
+          <a:prstGeom prst="rect">
+            <a:avLst/>
+          </a:prstGeom>
+          <a:ln/>
+        </p:spPr>
+        <p:style>
+          <a:lnRef idx="2">
+            <a:schemeClr val="accent1">
+              <a:shade val="15000"/>
+            </a:schemeClr>
+          </a:lnRef>
+          <a:fillRef idx="1">
+            <a:schemeClr val="accent1"/>
+          </a:fillRef>
+          <a:effectRef idx="0">
+            <a:schemeClr val="accent1"/>
+          </a:effectRef>
+          <a:fontRef idx="minor"/>
+        </p:style>
+      </p:sp>
+      <p:sp>
+        <p:nvSpPr>
+          <p:cNvPr id="265" name="CustomShape 27"/>
+          <p:cNvSpPr/>
+          <p:nvPr/>
+        </p:nvSpPr>
+        <p:spPr>
+          <a:xfrm>
+            <a:off x="3616920" y="4212720"/>
+            <a:ext cx="1440000" cy="366120"/>
+          </a:xfrm>
+          <a:prstGeom prst="rect">
+            <a:avLst/>
+          </a:prstGeom>
+          <a:noFill/>
+          <a:ln>
+            <a:noFill/>
+          </a:ln>
+        </p:spPr>
+        <p:style>
+          <a:lnRef idx="0"/>
+          <a:fillRef idx="0"/>
+          <a:effectRef idx="0"/>
+          <a:fontRef idx="minor"/>
+        </p:style>
+        <p:txBody>
+          <a:bodyPr>
+            <a:spAutoFit/>
+          </a:bodyPr>
+          <a:p>
+            <a:pPr>
+              <a:lnSpc>
+                <a:spcPct val="100000"/>
+              </a:lnSpc>
+            </a:pPr>
+            <a:r>
+              <a:rPr b="0" lang="en-US" sz="1800" spc="-1" strike="noStrike">
+                <a:solidFill>
+                  <a:srgbClr val="ffffff"/>
+                </a:solidFill>
+                <a:latin typeface="Arial"/>
+              </a:rPr>
+              <a:t>RingDisplay</a:t>
+            </a:r>
+            <a:endParaRPr b="0" lang="en-GB" sz="1800" spc="-1" strike="noStrike">
+              <a:latin typeface="Arial"/>
+            </a:endParaRPr>
+          </a:p>
+        </p:txBody>
+      </p:sp>
+      <p:sp>
+        <p:nvSpPr>
+          <p:cNvPr id="266" name="CustomShape 28"/>
+          <p:cNvSpPr/>
+          <p:nvPr/>
+        </p:nvSpPr>
+        <p:spPr>
+          <a:xfrm>
+            <a:off x="3155400" y="4578840"/>
+            <a:ext cx="2368080" cy="944280"/>
+          </a:xfrm>
+          <a:prstGeom prst="rect">
+            <a:avLst/>
+          </a:prstGeom>
+          <a:noFill/>
+          <a:ln>
+            <a:noFill/>
+          </a:ln>
+        </p:spPr>
+        <p:style>
+          <a:lnRef idx="0"/>
+          <a:fillRef idx="0"/>
+          <a:effectRef idx="0"/>
+          <a:fontRef idx="minor"/>
+        </p:style>
+        <p:txBody>
+          <a:bodyPr>
+            <a:spAutoFit/>
+          </a:bodyPr>
+          <a:p>
+            <a:pPr marL="285840" indent="-285480">
+              <a:lnSpc>
+                <a:spcPct val="100000"/>
+              </a:lnSpc>
+              <a:buClr>
+                <a:srgbClr val="ffffff"/>
+              </a:buClr>
+              <a:buFont typeface="Arial"/>
+              <a:buChar char="•"/>
+            </a:pPr>
+            <a:r>
+              <a:rPr b="0" lang="en-US" sz="1400" spc="-1" strike="noStrike">
+                <a:solidFill>
+                  <a:srgbClr val="ffffff"/>
+                </a:solidFill>
+                <a:latin typeface="Arial"/>
+              </a:rPr>
+              <a:t>Creates a new window</a:t>
+            </a:r>
+            <a:endParaRPr b="0" lang="en-GB" sz="1400" spc="-1" strike="noStrike">
+              <a:latin typeface="Arial"/>
+            </a:endParaRPr>
+          </a:p>
+          <a:p>
+            <a:pPr marL="285840" indent="-285480">
+              <a:lnSpc>
+                <a:spcPct val="100000"/>
+              </a:lnSpc>
+              <a:buClr>
+                <a:srgbClr val="ffffff"/>
+              </a:buClr>
+              <a:buFont typeface="Arial"/>
+              <a:buChar char="•"/>
+            </a:pPr>
+            <a:r>
+              <a:rPr b="0" lang="en-US" sz="1400" spc="-1" strike="noStrike">
+                <a:solidFill>
+                  <a:srgbClr val="ffffff"/>
+                </a:solidFill>
+                <a:latin typeface="Arial"/>
+              </a:rPr>
+              <a:t>Draws where OPAL has placed each element around the ring</a:t>
+            </a:r>
+            <a:endParaRPr b="0" lang="en-GB" sz="1400" spc="-1" strike="noStrike">
+              <a:latin typeface="Arial"/>
+            </a:endParaRPr>
+          </a:p>
+        </p:txBody>
+      </p:sp>
+      <p:sp>
+        <p:nvSpPr>
+          <p:cNvPr id="267" name="CustomShape 29"/>
+          <p:cNvSpPr/>
+          <p:nvPr/>
+        </p:nvSpPr>
+        <p:spPr>
+          <a:xfrm>
+            <a:off x="432000" y="4182120"/>
+            <a:ext cx="5603400" cy="1532880"/>
+          </a:xfrm>
+          <a:prstGeom prst="rect">
+            <a:avLst/>
+          </a:prstGeom>
+          <a:noFill/>
+          <a:ln w="28440">
+            <a:solidFill>
+              <a:schemeClr val="bg2">
+                <a:lumMod val="10000"/>
+              </a:schemeClr>
+            </a:solidFill>
+          </a:ln>
+        </p:spPr>
+        <p:style>
+          <a:lnRef idx="2">
+            <a:schemeClr val="accent1">
+              <a:shade val="15000"/>
+            </a:schemeClr>
+          </a:lnRef>
+          <a:fillRef idx="1">
+            <a:schemeClr val="accent1"/>
+          </a:fillRef>
+          <a:effectRef idx="0">
+            <a:schemeClr val="accent1"/>
+          </a:effectRef>
+          <a:fontRef idx="minor"/>
+        </p:style>
       </p:sp>
     </p:spTree>
   </p:cSld>
@@ -10769,7 +11017,7 @@
       </p:grpSpPr>
       <p:sp>
         <p:nvSpPr>
-          <p:cNvPr id="263" name="TextShape 1"/>
+          <p:cNvPr id="268" name="TextShape 1"/>
           <p:cNvSpPr txBox="1"/>
           <p:nvPr/>
         </p:nvSpPr>
@@ -10804,7 +11052,17 @@
                 <a:latin typeface="Arial"/>
                 <a:ea typeface="Verdana"/>
               </a:rPr>
-              <a:t>Multiprocessing</a:t>
+              <a:t>Multiproc</a:t>
+            </a:r>
+            <a:r>
+              <a:rPr b="0" lang="en-US" sz="2800" spc="-1" strike="noStrike">
+                <a:solidFill>
+                  <a:srgbClr val="003088"/>
+                </a:solidFill>
+                <a:latin typeface="Arial"/>
+                <a:ea typeface="Verdana"/>
+              </a:rPr>
+              <a:t>essing</a:t>
             </a:r>
             <a:endParaRPr b="0" lang="en-US" sz="2800" spc="-1" strike="noStrike">
               <a:solidFill>
@@ -10817,7 +11075,7 @@
       </p:sp>
       <p:sp>
         <p:nvSpPr>
-          <p:cNvPr id="264" name="TextShape 2"/>
+          <p:cNvPr id="269" name="TextShape 2"/>
           <p:cNvSpPr txBox="1"/>
           <p:nvPr/>
         </p:nvSpPr>
@@ -10891,7 +11149,17 @@
                 <a:latin typeface="Arial"/>
                 <a:ea typeface="Verdana"/>
               </a:rPr>
-              <a:t>OPAL is run as a separate process from the interface.</a:t>
+              <a:t>OPAL is run as a separate process from the </a:t>
+            </a:r>
+            <a:r>
+              <a:rPr b="0" lang="en-US" sz="2000" spc="-1" strike="noStrike">
+                <a:solidFill>
+                  <a:srgbClr val="44546a"/>
+                </a:solidFill>
+                <a:latin typeface="Arial"/>
+                <a:ea typeface="Verdana"/>
+              </a:rPr>
+              <a:t>interface.</a:t>
             </a:r>
             <a:endParaRPr b="0" lang="en-US" sz="2000" spc="-1" strike="noStrike">
               <a:solidFill>
@@ -10922,7 +11190,17 @@
                 <a:latin typeface="Arial"/>
                 <a:ea typeface="Verdana"/>
               </a:rPr>
-              <a:t>A manager is used so there is a shared memory space between all processes.</a:t>
+              <a:t>A manager is used so there is a shared </a:t>
+            </a:r>
+            <a:r>
+              <a:rPr b="0" lang="en-US" sz="2000" spc="-1" strike="noStrike">
+                <a:solidFill>
+                  <a:srgbClr val="44546a"/>
+                </a:solidFill>
+                <a:latin typeface="Arial"/>
+                <a:ea typeface="Verdana"/>
+              </a:rPr>
+              <a:t>memory space between all processes.</a:t>
             </a:r>
             <a:endParaRPr b="0" lang="en-US" sz="2000" spc="-1" strike="noStrike">
               <a:solidFill>
@@ -10953,7 +11231,17 @@
                 <a:latin typeface="Arial"/>
                 <a:ea typeface="Verdana"/>
               </a:rPr>
-              <a:t>Data can then be passed between OPAL and the interface.</a:t>
+              <a:t>Data can then be passed between OPAL and </a:t>
+            </a:r>
+            <a:r>
+              <a:rPr b="0" lang="en-US" sz="2000" spc="-1" strike="noStrike">
+                <a:solidFill>
+                  <a:srgbClr val="44546a"/>
+                </a:solidFill>
+                <a:latin typeface="Arial"/>
+                <a:ea typeface="Verdana"/>
+              </a:rPr>
+              <a:t>the interface.</a:t>
             </a:r>
             <a:endParaRPr b="0" lang="en-US" sz="2000" spc="-1" strike="noStrike">
               <a:solidFill>
@@ -10982,7 +11270,7 @@
       </p:sp>
       <p:pic>
         <p:nvPicPr>
-          <p:cNvPr id="265" name="Picture 6" descr=""/>
+          <p:cNvPr id="270" name="Picture 6" descr=""/>
           <p:cNvPicPr/>
           <p:nvPr/>
         </p:nvPicPr>
@@ -11005,7 +11293,7 @@
       </p:pic>
       <p:pic>
         <p:nvPicPr>
-          <p:cNvPr id="266" name="Picture 8" descr=""/>
+          <p:cNvPr id="271" name="Picture 8" descr=""/>
           <p:cNvPicPr/>
           <p:nvPr/>
         </p:nvPicPr>
@@ -11058,7 +11346,7 @@
       </p:grpSpPr>
       <p:sp>
         <p:nvSpPr>
-          <p:cNvPr id="267" name="TextShape 1"/>
+          <p:cNvPr id="272" name="TextShape 1"/>
           <p:cNvSpPr txBox="1"/>
           <p:nvPr/>
         </p:nvSpPr>
@@ -11106,7 +11394,7 @@
       </p:sp>
       <p:sp>
         <p:nvSpPr>
-          <p:cNvPr id="268" name="TextShape 2"/>
+          <p:cNvPr id="273" name="TextShape 2"/>
           <p:cNvSpPr txBox="1"/>
           <p:nvPr/>
         </p:nvSpPr>
@@ -11198,7 +11486,7 @@
       </p:sp>
       <p:sp>
         <p:nvSpPr>
-          <p:cNvPr id="269" name="CustomShape 3"/>
+          <p:cNvPr id="274" name="CustomShape 3"/>
           <p:cNvSpPr/>
           <p:nvPr/>
         </p:nvSpPr>
@@ -11229,7 +11517,7 @@
       </p:sp>
       <p:sp>
         <p:nvSpPr>
-          <p:cNvPr id="270" name="CustomShape 4"/>
+          <p:cNvPr id="275" name="CustomShape 4"/>
           <p:cNvSpPr/>
           <p:nvPr/>
         </p:nvSpPr>
@@ -11279,7 +11567,7 @@
       </p:sp>
       <p:sp>
         <p:nvSpPr>
-          <p:cNvPr id="271" name="CustomShape 5"/>
+          <p:cNvPr id="276" name="CustomShape 5"/>
           <p:cNvSpPr/>
           <p:nvPr/>
         </p:nvSpPr>
@@ -11409,7 +11697,7 @@
       </p:sp>
       <p:sp>
         <p:nvSpPr>
-          <p:cNvPr id="272" name="CustomShape 6"/>
+          <p:cNvPr id="277" name="CustomShape 6"/>
           <p:cNvSpPr/>
           <p:nvPr/>
         </p:nvSpPr>
@@ -11443,7 +11731,7 @@
       </p:sp>
       <p:sp>
         <p:nvSpPr>
-          <p:cNvPr id="273" name="CustomShape 7"/>
+          <p:cNvPr id="278" name="CustomShape 7"/>
           <p:cNvSpPr/>
           <p:nvPr/>
         </p:nvSpPr>
@@ -11573,7 +11861,7 @@
       </p:sp>
       <p:sp>
         <p:nvSpPr>
-          <p:cNvPr id="274" name="CustomShape 8"/>
+          <p:cNvPr id="279" name="CustomShape 8"/>
           <p:cNvSpPr/>
           <p:nvPr/>
         </p:nvSpPr>
@@ -11604,7 +11892,7 @@
       </p:sp>
       <p:sp>
         <p:nvSpPr>
-          <p:cNvPr id="275" name="CustomShape 9"/>
+          <p:cNvPr id="280" name="CustomShape 9"/>
           <p:cNvSpPr/>
           <p:nvPr/>
         </p:nvSpPr>
@@ -11734,7 +12022,7 @@
       </p:sp>
       <p:sp>
         <p:nvSpPr>
-          <p:cNvPr id="276" name="CustomShape 10"/>
+          <p:cNvPr id="281" name="CustomShape 10"/>
           <p:cNvSpPr/>
           <p:nvPr/>
         </p:nvSpPr>
@@ -11784,7 +12072,7 @@
       </p:sp>
       <p:sp>
         <p:nvSpPr>
-          <p:cNvPr id="277" name="CustomShape 11"/>
+          <p:cNvPr id="282" name="CustomShape 11"/>
           <p:cNvSpPr/>
           <p:nvPr/>
         </p:nvSpPr>
@@ -12167,7 +12455,7 @@
       </p:grpSpPr>
       <p:sp>
         <p:nvSpPr>
-          <p:cNvPr id="278" name="TextShape 1"/>
+          <p:cNvPr id="283" name="TextShape 1"/>
           <p:cNvSpPr txBox="1"/>
           <p:nvPr/>
         </p:nvSpPr>
@@ -12212,7 +12500,17 @@
                 <a:latin typeface="Arial"/>
                 <a:ea typeface="Verdana"/>
               </a:rPr>
-              <a:t>flow diagram</a:t>
+              <a:t>flow </a:t>
+            </a:r>
+            <a:r>
+              <a:rPr b="0" lang="en-US" sz="2800" spc="-1" strike="noStrike">
+                <a:solidFill>
+                  <a:srgbClr val="003088"/>
+                </a:solidFill>
+                <a:latin typeface="Arial"/>
+                <a:ea typeface="Verdana"/>
+              </a:rPr>
+              <a:t>diagram</a:t>
             </a:r>
             <a:endParaRPr b="0" lang="en-US" sz="2800" spc="-1" strike="noStrike">
               <a:solidFill>
@@ -12225,7 +12523,7 @@
       </p:sp>
       <p:sp>
         <p:nvSpPr>
-          <p:cNvPr id="279" name="CustomShape 2"/>
+          <p:cNvPr id="284" name="CustomShape 2"/>
           <p:cNvSpPr/>
           <p:nvPr/>
         </p:nvSpPr>
@@ -12280,7 +12578,7 @@
       </p:sp>
       <p:sp>
         <p:nvSpPr>
-          <p:cNvPr id="280" name="CustomShape 3"/>
+          <p:cNvPr id="285" name="CustomShape 3"/>
           <p:cNvSpPr/>
           <p:nvPr/>
         </p:nvSpPr>
@@ -12317,7 +12615,7 @@
       </p:sp>
       <p:sp>
         <p:nvSpPr>
-          <p:cNvPr id="281" name="CustomShape 4"/>
+          <p:cNvPr id="286" name="CustomShape 4"/>
           <p:cNvSpPr/>
           <p:nvPr/>
         </p:nvSpPr>
@@ -12372,7 +12670,7 @@
       </p:sp>
       <p:sp>
         <p:nvSpPr>
-          <p:cNvPr id="282" name="CustomShape 5"/>
+          <p:cNvPr id="287" name="CustomShape 5"/>
           <p:cNvSpPr/>
           <p:nvPr/>
         </p:nvSpPr>
@@ -12409,7 +12707,7 @@
       </p:sp>
       <p:sp>
         <p:nvSpPr>
-          <p:cNvPr id="283" name="CustomShape 6"/>
+          <p:cNvPr id="288" name="CustomShape 6"/>
           <p:cNvSpPr/>
           <p:nvPr/>
         </p:nvSpPr>
@@ -12464,7 +12762,7 @@
       </p:sp>
       <p:sp>
         <p:nvSpPr>
-          <p:cNvPr id="284" name="CustomShape 7"/>
+          <p:cNvPr id="289" name="CustomShape 7"/>
           <p:cNvSpPr/>
           <p:nvPr/>
         </p:nvSpPr>
@@ -12501,7 +12799,7 @@
       </p:sp>
       <p:sp>
         <p:nvSpPr>
-          <p:cNvPr id="285" name="CustomShape 8"/>
+          <p:cNvPr id="290" name="CustomShape 8"/>
           <p:cNvSpPr/>
           <p:nvPr/>
         </p:nvSpPr>
@@ -12538,7 +12836,7 @@
       </p:sp>
       <p:sp>
         <p:nvSpPr>
-          <p:cNvPr id="286" name="CustomShape 9"/>
+          <p:cNvPr id="291" name="CustomShape 9"/>
           <p:cNvSpPr/>
           <p:nvPr/>
         </p:nvSpPr>
@@ -12575,7 +12873,7 @@
       </p:sp>
       <p:sp>
         <p:nvSpPr>
-          <p:cNvPr id="287" name="CustomShape 10"/>
+          <p:cNvPr id="292" name="CustomShape 10"/>
           <p:cNvSpPr/>
           <p:nvPr/>
         </p:nvSpPr>
@@ -12612,7 +12910,7 @@
       </p:sp>
       <p:sp>
         <p:nvSpPr>
-          <p:cNvPr id="288" name="CustomShape 11"/>
+          <p:cNvPr id="293" name="CustomShape 11"/>
           <p:cNvSpPr/>
           <p:nvPr/>
         </p:nvSpPr>
@@ -12667,7 +12965,7 @@
       </p:sp>
       <p:sp>
         <p:nvSpPr>
-          <p:cNvPr id="289" name="CustomShape 12"/>
+          <p:cNvPr id="294" name="CustomShape 12"/>
           <p:cNvSpPr/>
           <p:nvPr/>
         </p:nvSpPr>
@@ -12722,7 +13020,7 @@
       </p:sp>
       <p:sp>
         <p:nvSpPr>
-          <p:cNvPr id="290" name="CustomShape 13"/>
+          <p:cNvPr id="295" name="CustomShape 13"/>
           <p:cNvSpPr/>
           <p:nvPr/>
         </p:nvSpPr>
@@ -12777,7 +13075,7 @@
       </p:sp>
       <p:sp>
         <p:nvSpPr>
-          <p:cNvPr id="291" name="CustomShape 14"/>
+          <p:cNvPr id="296" name="CustomShape 14"/>
           <p:cNvSpPr/>
           <p:nvPr/>
         </p:nvSpPr>
@@ -12832,7 +13130,7 @@
       </p:sp>
       <p:sp>
         <p:nvSpPr>
-          <p:cNvPr id="292" name="CustomShape 15"/>
+          <p:cNvPr id="297" name="CustomShape 15"/>
           <p:cNvSpPr/>
           <p:nvPr/>
         </p:nvSpPr>
@@ -12887,14 +13185,14 @@
       </p:sp>
       <p:sp>
         <p:nvSpPr>
-          <p:cNvPr id="293" name="CustomShape 16"/>
-          <p:cNvSpPr/>
-          <p:nvPr/>
-        </p:nvSpPr>
-        <p:spPr>
-          <a:xfrm>
-            <a:off x="6476040" y="4229280"/>
-            <a:ext cx="1287360" cy="335160"/>
+          <p:cNvPr id="298" name="CustomShape 16"/>
+          <p:cNvSpPr/>
+          <p:nvPr/>
+        </p:nvSpPr>
+        <p:spPr>
+          <a:xfrm>
+            <a:off x="5832000" y="4200840"/>
+            <a:ext cx="2592000" cy="335160"/>
           </a:xfrm>
           <a:prstGeom prst="rect">
             <a:avLst/>
@@ -12932,7 +13230,7 @@
                 </a:solidFill>
                 <a:latin typeface="Arial"/>
               </a:rPr>
-              <a:t>draw OPAL</a:t>
+              <a:t>Make ring display window</a:t>
             </a:r>
             <a:endParaRPr b="0" lang="en-GB" sz="1600" spc="-1" strike="noStrike">
               <a:latin typeface="Arial"/>
@@ -12942,7 +13240,7 @@
       </p:sp>
       <p:sp>
         <p:nvSpPr>
-          <p:cNvPr id="294" name="CustomShape 17"/>
+          <p:cNvPr id="299" name="CustomShape 17"/>
           <p:cNvSpPr/>
           <p:nvPr/>
         </p:nvSpPr>
@@ -12997,7 +13295,7 @@
       </p:sp>
       <p:sp>
         <p:nvSpPr>
-          <p:cNvPr id="295" name="CustomShape 18"/>
+          <p:cNvPr id="300" name="CustomShape 18"/>
           <p:cNvSpPr/>
           <p:nvPr/>
         </p:nvSpPr>
@@ -13052,7 +13350,7 @@
       </p:sp>
       <p:sp>
         <p:nvSpPr>
-          <p:cNvPr id="296" name="CustomShape 19"/>
+          <p:cNvPr id="301" name="CustomShape 19"/>
           <p:cNvSpPr/>
           <p:nvPr/>
         </p:nvSpPr>
@@ -13107,7 +13405,7 @@
       </p:sp>
       <p:sp>
         <p:nvSpPr>
-          <p:cNvPr id="297" name="CustomShape 20"/>
+          <p:cNvPr id="302" name="CustomShape 20"/>
           <p:cNvSpPr/>
           <p:nvPr/>
         </p:nvSpPr>
@@ -13162,7 +13460,7 @@
       </p:sp>
       <p:sp>
         <p:nvSpPr>
-          <p:cNvPr id="298" name="CustomShape 21"/>
+          <p:cNvPr id="303" name="CustomShape 21"/>
           <p:cNvSpPr/>
           <p:nvPr/>
         </p:nvSpPr>
@@ -13199,7 +13497,7 @@
       </p:sp>
       <p:sp>
         <p:nvSpPr>
-          <p:cNvPr id="299" name="CustomShape 22"/>
+          <p:cNvPr id="304" name="CustomShape 22"/>
           <p:cNvSpPr/>
           <p:nvPr/>
         </p:nvSpPr>
@@ -13236,7 +13534,7 @@
       </p:sp>
       <p:sp>
         <p:nvSpPr>
-          <p:cNvPr id="300" name="CustomShape 23"/>
+          <p:cNvPr id="305" name="CustomShape 23"/>
           <p:cNvSpPr/>
           <p:nvPr/>
         </p:nvSpPr>
@@ -13273,7 +13571,7 @@
       </p:sp>
       <p:sp>
         <p:nvSpPr>
-          <p:cNvPr id="301" name="CustomShape 24"/>
+          <p:cNvPr id="306" name="CustomShape 24"/>
           <p:cNvSpPr/>
           <p:nvPr/>
         </p:nvSpPr>
@@ -13310,7 +13608,7 @@
       </p:sp>
       <p:sp>
         <p:nvSpPr>
-          <p:cNvPr id="302" name="CustomShape 25"/>
+          <p:cNvPr id="307" name="CustomShape 25"/>
           <p:cNvSpPr/>
           <p:nvPr/>
         </p:nvSpPr>
@@ -13347,7 +13645,7 @@
       </p:sp>
       <p:sp>
         <p:nvSpPr>
-          <p:cNvPr id="303" name="CustomShape 26"/>
+          <p:cNvPr id="308" name="CustomShape 26"/>
           <p:cNvSpPr/>
           <p:nvPr/>
         </p:nvSpPr>
@@ -13384,7 +13682,7 @@
       </p:sp>
       <p:sp>
         <p:nvSpPr>
-          <p:cNvPr id="304" name="CustomShape 27"/>
+          <p:cNvPr id="309" name="CustomShape 27"/>
           <p:cNvSpPr/>
           <p:nvPr/>
         </p:nvSpPr>
@@ -13427,7 +13725,7 @@
       </p:sp>
       <p:sp>
         <p:nvSpPr>
-          <p:cNvPr id="305" name="CustomShape 28"/>
+          <p:cNvPr id="310" name="CustomShape 28"/>
           <p:cNvSpPr/>
           <p:nvPr/>
         </p:nvSpPr>
@@ -13470,7 +13768,7 @@
       </p:sp>
       <p:sp>
         <p:nvSpPr>
-          <p:cNvPr id="306" name="CustomShape 29"/>
+          <p:cNvPr id="311" name="CustomShape 29"/>
           <p:cNvSpPr/>
           <p:nvPr/>
         </p:nvSpPr>
@@ -13507,7 +13805,7 @@
       </p:sp>
       <p:sp>
         <p:nvSpPr>
-          <p:cNvPr id="307" name="CustomShape 30"/>
+          <p:cNvPr id="312" name="CustomShape 30"/>
           <p:cNvSpPr/>
           <p:nvPr/>
         </p:nvSpPr>
@@ -13544,7 +13842,7 @@
       </p:sp>
       <p:sp>
         <p:nvSpPr>
-          <p:cNvPr id="308" name="CustomShape 31"/>
+          <p:cNvPr id="313" name="CustomShape 31"/>
           <p:cNvSpPr/>
           <p:nvPr/>
         </p:nvSpPr>
@@ -13581,7 +13879,7 @@
       </p:sp>
       <p:sp>
         <p:nvSpPr>
-          <p:cNvPr id="309" name="CustomShape 32"/>
+          <p:cNvPr id="314" name="CustomShape 32"/>
           <p:cNvSpPr/>
           <p:nvPr/>
         </p:nvSpPr>
@@ -13618,7 +13916,7 @@
       </p:sp>
       <p:sp>
         <p:nvSpPr>
-          <p:cNvPr id="310" name="CustomShape 33"/>
+          <p:cNvPr id="315" name="CustomShape 33"/>
           <p:cNvSpPr/>
           <p:nvPr/>
         </p:nvSpPr>
@@ -13655,7 +13953,7 @@
       </p:sp>
       <p:sp>
         <p:nvSpPr>
-          <p:cNvPr id="311" name="CustomShape 34"/>
+          <p:cNvPr id="316" name="CustomShape 34"/>
           <p:cNvSpPr/>
           <p:nvPr/>
         </p:nvSpPr>
@@ -13692,7 +13990,7 @@
       </p:sp>
       <p:sp>
         <p:nvSpPr>
-          <p:cNvPr id="312" name="CustomShape 35"/>
+          <p:cNvPr id="317" name="CustomShape 35"/>
           <p:cNvSpPr/>
           <p:nvPr/>
         </p:nvSpPr>
@@ -13729,7 +14027,7 @@
       </p:sp>
       <p:sp>
         <p:nvSpPr>
-          <p:cNvPr id="313" name="CustomShape 36"/>
+          <p:cNvPr id="318" name="CustomShape 36"/>
           <p:cNvSpPr/>
           <p:nvPr/>
         </p:nvSpPr>
@@ -13766,7 +14064,7 @@
       </p:sp>
       <p:sp>
         <p:nvSpPr>
-          <p:cNvPr id="314" name="CustomShape 37"/>
+          <p:cNvPr id="319" name="CustomShape 37"/>
           <p:cNvSpPr/>
           <p:nvPr/>
         </p:nvSpPr>
@@ -13809,7 +14107,7 @@
       </p:sp>
       <p:sp>
         <p:nvSpPr>
-          <p:cNvPr id="315" name="CustomShape 38"/>
+          <p:cNvPr id="320" name="CustomShape 38"/>
           <p:cNvSpPr/>
           <p:nvPr/>
         </p:nvSpPr>
@@ -13852,7 +14150,7 @@
       </p:sp>
       <p:sp>
         <p:nvSpPr>
-          <p:cNvPr id="316" name="CustomShape 39"/>
+          <p:cNvPr id="321" name="CustomShape 39"/>
           <p:cNvSpPr/>
           <p:nvPr/>
         </p:nvSpPr>
@@ -13889,7 +14187,7 @@
       </p:sp>
       <p:sp>
         <p:nvSpPr>
-          <p:cNvPr id="317" name="CustomShape 40"/>
+          <p:cNvPr id="322" name="CustomShape 40"/>
           <p:cNvSpPr/>
           <p:nvPr/>
         </p:nvSpPr>
@@ -14001,7 +14299,7 @@
       </p:sp>
       <p:sp>
         <p:nvSpPr>
-          <p:cNvPr id="318" name="CustomShape 41"/>
+          <p:cNvPr id="323" name="CustomShape 41"/>
           <p:cNvSpPr/>
           <p:nvPr/>
         </p:nvSpPr>
@@ -14041,7 +14339,7 @@
       </p:sp>
       <p:sp>
         <p:nvSpPr>
-          <p:cNvPr id="319" name="CustomShape 42"/>
+          <p:cNvPr id="324" name="CustomShape 42"/>
           <p:cNvSpPr/>
           <p:nvPr/>
         </p:nvSpPr>
@@ -14091,7 +14389,7 @@
       </p:sp>
       <p:sp>
         <p:nvSpPr>
-          <p:cNvPr id="320" name="CustomShape 43"/>
+          <p:cNvPr id="325" name="CustomShape 43"/>
           <p:cNvSpPr/>
           <p:nvPr/>
         </p:nvSpPr>
@@ -14135,7 +14433,7 @@
       </p:sp>
       <p:sp>
         <p:nvSpPr>
-          <p:cNvPr id="321" name="CustomShape 44"/>
+          <p:cNvPr id="326" name="CustomShape 44"/>
           <p:cNvSpPr/>
           <p:nvPr/>
         </p:nvSpPr>
@@ -14185,7 +14483,7 @@
       </p:sp>
       <p:sp>
         <p:nvSpPr>
-          <p:cNvPr id="322" name="CustomShape 45"/>
+          <p:cNvPr id="327" name="CustomShape 45"/>
           <p:cNvSpPr/>
           <p:nvPr/>
         </p:nvSpPr>
@@ -14229,14 +14527,14 @@
       </p:sp>
       <p:sp>
         <p:nvSpPr>
-          <p:cNvPr id="323" name="CustomShape 46"/>
+          <p:cNvPr id="328" name="CustomShape 46"/>
           <p:cNvSpPr/>
           <p:nvPr/>
         </p:nvSpPr>
         <p:spPr>
           <a:xfrm flipV="1" rot="5400000">
-            <a:off x="4120200" y="2082240"/>
-            <a:ext cx="160200" cy="4550760"/>
+            <a:off x="3798360" y="2404080"/>
+            <a:ext cx="160200" cy="3907080"/>
           </a:xfrm>
           <a:prstGeom prst="downArrow">
             <a:avLst>
@@ -14273,7 +14571,7 @@
       </p:sp>
       <p:sp>
         <p:nvSpPr>
-          <p:cNvPr id="324" name="CustomShape 47"/>
+          <p:cNvPr id="329" name="CustomShape 47"/>
           <p:cNvSpPr/>
           <p:nvPr/>
         </p:nvSpPr>
@@ -14323,7 +14621,7 @@
       </p:sp>
       <p:sp>
         <p:nvSpPr>
-          <p:cNvPr id="325" name="CustomShape 48"/>
+          <p:cNvPr id="330" name="CustomShape 48"/>
           <p:cNvSpPr/>
           <p:nvPr/>
         </p:nvSpPr>
@@ -14378,7 +14676,7 @@
       </p:sp>
       <p:sp>
         <p:nvSpPr>
-          <p:cNvPr id="326" name="CustomShape 49"/>
+          <p:cNvPr id="331" name="CustomShape 49"/>
           <p:cNvSpPr/>
           <p:nvPr/>
         </p:nvSpPr>
@@ -14415,7 +14713,7 @@
       </p:sp>
       <p:sp>
         <p:nvSpPr>
-          <p:cNvPr id="327" name="CustomShape 50"/>
+          <p:cNvPr id="332" name="CustomShape 50"/>
           <p:cNvSpPr/>
           <p:nvPr/>
         </p:nvSpPr>
@@ -14458,7 +14756,7 @@
       </p:sp>
       <p:sp>
         <p:nvSpPr>
-          <p:cNvPr id="328" name="CustomShape 51"/>
+          <p:cNvPr id="333" name="CustomShape 51"/>
           <p:cNvSpPr/>
           <p:nvPr/>
         </p:nvSpPr>
@@ -14501,7 +14799,7 @@
       </p:sp>
       <p:sp>
         <p:nvSpPr>
-          <p:cNvPr id="329" name="CustomShape 52"/>
+          <p:cNvPr id="334" name="CustomShape 52"/>
           <p:cNvSpPr/>
           <p:nvPr/>
         </p:nvSpPr>
@@ -14551,7 +14849,7 @@
       </p:sp>
       <p:sp>
         <p:nvSpPr>
-          <p:cNvPr id="330" name="CustomShape 53"/>
+          <p:cNvPr id="335" name="CustomShape 53"/>
           <p:cNvSpPr/>
           <p:nvPr/>
         </p:nvSpPr>
@@ -14631,7 +14929,7 @@
       </p:grpSpPr>
       <p:sp>
         <p:nvSpPr>
-          <p:cNvPr id="331" name="TextShape 1"/>
+          <p:cNvPr id="336" name="TextShape 1"/>
           <p:cNvSpPr txBox="1"/>
           <p:nvPr/>
         </p:nvSpPr>
@@ -14679,7 +14977,7 @@
       </p:sp>
       <p:sp>
         <p:nvSpPr>
-          <p:cNvPr id="332" name="CustomShape 2"/>
+          <p:cNvPr id="337" name="CustomShape 2"/>
           <p:cNvSpPr/>
           <p:nvPr/>
         </p:nvSpPr>
@@ -14734,7 +15032,7 @@
       </p:sp>
       <p:sp>
         <p:nvSpPr>
-          <p:cNvPr id="333" name="CustomShape 3"/>
+          <p:cNvPr id="338" name="CustomShape 3"/>
           <p:cNvSpPr/>
           <p:nvPr/>
         </p:nvSpPr>
@@ -14771,7 +15069,7 @@
       </p:sp>
       <p:sp>
         <p:nvSpPr>
-          <p:cNvPr id="334" name="CustomShape 4"/>
+          <p:cNvPr id="339" name="CustomShape 4"/>
           <p:cNvSpPr/>
           <p:nvPr/>
         </p:nvSpPr>
@@ -14826,7 +15124,7 @@
       </p:sp>
       <p:sp>
         <p:nvSpPr>
-          <p:cNvPr id="335" name="CustomShape 5"/>
+          <p:cNvPr id="340" name="CustomShape 5"/>
           <p:cNvSpPr/>
           <p:nvPr/>
         </p:nvSpPr>
@@ -14863,7 +15161,7 @@
       </p:sp>
       <p:sp>
         <p:nvSpPr>
-          <p:cNvPr id="336" name="CustomShape 6"/>
+          <p:cNvPr id="341" name="CustomShape 6"/>
           <p:cNvSpPr/>
           <p:nvPr/>
         </p:nvSpPr>
@@ -14918,7 +15216,7 @@
       </p:sp>
       <p:sp>
         <p:nvSpPr>
-          <p:cNvPr id="337" name="CustomShape 7"/>
+          <p:cNvPr id="342" name="CustomShape 7"/>
           <p:cNvSpPr/>
           <p:nvPr/>
         </p:nvSpPr>
@@ -14973,7 +15271,7 @@
       </p:sp>
       <p:sp>
         <p:nvSpPr>
-          <p:cNvPr id="338" name="CustomShape 8"/>
+          <p:cNvPr id="343" name="CustomShape 8"/>
           <p:cNvSpPr/>
           <p:nvPr/>
         </p:nvSpPr>
@@ -15028,7 +15326,7 @@
       </p:sp>
       <p:sp>
         <p:nvSpPr>
-          <p:cNvPr id="339" name="CustomShape 9"/>
+          <p:cNvPr id="344" name="CustomShape 9"/>
           <p:cNvSpPr/>
           <p:nvPr/>
         </p:nvSpPr>
@@ -15083,7 +15381,7 @@
       </p:sp>
       <p:sp>
         <p:nvSpPr>
-          <p:cNvPr id="340" name="CustomShape 10"/>
+          <p:cNvPr id="345" name="CustomShape 10"/>
           <p:cNvSpPr/>
           <p:nvPr/>
         </p:nvSpPr>
@@ -15120,7 +15418,7 @@
       </p:sp>
       <p:sp>
         <p:nvSpPr>
-          <p:cNvPr id="341" name="CustomShape 11"/>
+          <p:cNvPr id="346" name="CustomShape 11"/>
           <p:cNvSpPr/>
           <p:nvPr/>
         </p:nvSpPr>
@@ -15157,7 +15455,7 @@
       </p:sp>
       <p:sp>
         <p:nvSpPr>
-          <p:cNvPr id="342" name="CustomShape 12"/>
+          <p:cNvPr id="347" name="CustomShape 12"/>
           <p:cNvSpPr/>
           <p:nvPr/>
         </p:nvSpPr>
@@ -15194,7 +15492,7 @@
       </p:sp>
       <p:sp>
         <p:nvSpPr>
-          <p:cNvPr id="343" name="CustomShape 13"/>
+          <p:cNvPr id="348" name="CustomShape 13"/>
           <p:cNvSpPr/>
           <p:nvPr/>
         </p:nvSpPr>
@@ -15231,7 +15529,7 @@
       </p:sp>
       <p:sp>
         <p:nvSpPr>
-          <p:cNvPr id="344" name="CustomShape 14"/>
+          <p:cNvPr id="349" name="CustomShape 14"/>
           <p:cNvSpPr/>
           <p:nvPr/>
         </p:nvSpPr>
@@ -15275,7 +15573,7 @@
       </p:sp>
       <p:sp>
         <p:nvSpPr>
-          <p:cNvPr id="345" name="CustomShape 15"/>
+          <p:cNvPr id="350" name="CustomShape 15"/>
           <p:cNvSpPr/>
           <p:nvPr/>
         </p:nvSpPr>
@@ -15325,7 +15623,7 @@
       </p:sp>
       <p:sp>
         <p:nvSpPr>
-          <p:cNvPr id="346" name="CustomShape 16"/>
+          <p:cNvPr id="351" name="CustomShape 16"/>
           <p:cNvSpPr/>
           <p:nvPr/>
         </p:nvSpPr>
@@ -15362,7 +15660,7 @@
       </p:sp>
       <p:sp>
         <p:nvSpPr>
-          <p:cNvPr id="347" name="CustomShape 17"/>
+          <p:cNvPr id="352" name="CustomShape 17"/>
           <p:cNvSpPr/>
           <p:nvPr/>
         </p:nvSpPr>
@@ -15399,7 +15697,7 @@
       </p:sp>
       <p:sp>
         <p:nvSpPr>
-          <p:cNvPr id="348" name="CustomShape 18"/>
+          <p:cNvPr id="353" name="CustomShape 18"/>
           <p:cNvSpPr/>
           <p:nvPr/>
         </p:nvSpPr>
@@ -15436,7 +15734,7 @@
       </p:sp>
       <p:sp>
         <p:nvSpPr>
-          <p:cNvPr id="349" name="CustomShape 19"/>
+          <p:cNvPr id="354" name="CustomShape 19"/>
           <p:cNvSpPr/>
           <p:nvPr/>
         </p:nvSpPr>
@@ -15491,7 +15789,7 @@
       </p:sp>
       <p:sp>
         <p:nvSpPr>
-          <p:cNvPr id="350" name="CustomShape 20"/>
+          <p:cNvPr id="355" name="CustomShape 20"/>
           <p:cNvSpPr/>
           <p:nvPr/>
         </p:nvSpPr>
@@ -15528,7 +15826,7 @@
       </p:sp>
       <p:sp>
         <p:nvSpPr>
-          <p:cNvPr id="351" name="CustomShape 21"/>
+          <p:cNvPr id="356" name="CustomShape 21"/>
           <p:cNvSpPr/>
           <p:nvPr/>
         </p:nvSpPr>
@@ -15583,7 +15881,7 @@
       </p:sp>
       <p:sp>
         <p:nvSpPr>
-          <p:cNvPr id="352" name="CustomShape 22"/>
+          <p:cNvPr id="357" name="CustomShape 22"/>
           <p:cNvSpPr/>
           <p:nvPr/>
         </p:nvSpPr>
@@ -15620,7 +15918,7 @@
       </p:sp>
       <p:sp>
         <p:nvSpPr>
-          <p:cNvPr id="353" name="CustomShape 23"/>
+          <p:cNvPr id="358" name="CustomShape 23"/>
           <p:cNvSpPr/>
           <p:nvPr/>
         </p:nvSpPr>
@@ -15675,7 +15973,7 @@
       </p:sp>
       <p:sp>
         <p:nvSpPr>
-          <p:cNvPr id="354" name="CustomShape 24"/>
+          <p:cNvPr id="359" name="CustomShape 24"/>
           <p:cNvSpPr/>
           <p:nvPr/>
         </p:nvSpPr>
@@ -15719,7 +16017,7 @@
       </p:sp>
       <p:sp>
         <p:nvSpPr>
-          <p:cNvPr id="355" name="CustomShape 25"/>
+          <p:cNvPr id="360" name="CustomShape 25"/>
           <p:cNvSpPr/>
           <p:nvPr/>
         </p:nvSpPr>
@@ -15769,7 +16067,7 @@
       </p:sp>
       <p:sp>
         <p:nvSpPr>
-          <p:cNvPr id="356" name="CustomShape 26"/>
+          <p:cNvPr id="361" name="CustomShape 26"/>
           <p:cNvSpPr/>
           <p:nvPr/>
         </p:nvSpPr>
@@ -15806,7 +16104,7 @@
       </p:sp>
       <p:sp>
         <p:nvSpPr>
-          <p:cNvPr id="357" name="CustomShape 27"/>
+          <p:cNvPr id="362" name="CustomShape 27"/>
           <p:cNvSpPr/>
           <p:nvPr/>
         </p:nvSpPr>
@@ -15861,7 +16159,7 @@
       </p:sp>
       <p:sp>
         <p:nvSpPr>
-          <p:cNvPr id="358" name="CustomShape 28"/>
+          <p:cNvPr id="363" name="CustomShape 28"/>
           <p:cNvSpPr/>
           <p:nvPr/>
         </p:nvSpPr>
@@ -15898,7 +16196,7 @@
       </p:sp>
       <p:sp>
         <p:nvSpPr>
-          <p:cNvPr id="359" name="CustomShape 29"/>
+          <p:cNvPr id="364" name="CustomShape 29"/>
           <p:cNvSpPr/>
           <p:nvPr/>
         </p:nvSpPr>
@@ -15953,7 +16251,7 @@
       </p:sp>
       <p:sp>
         <p:nvSpPr>
-          <p:cNvPr id="360" name="CustomShape 30"/>
+          <p:cNvPr id="365" name="CustomShape 30"/>
           <p:cNvSpPr/>
           <p:nvPr/>
         </p:nvSpPr>
@@ -15990,7 +16288,7 @@
       </p:sp>
       <p:sp>
         <p:nvSpPr>
-          <p:cNvPr id="361" name="CustomShape 31"/>
+          <p:cNvPr id="366" name="CustomShape 31"/>
           <p:cNvSpPr/>
           <p:nvPr/>
         </p:nvSpPr>
@@ -16045,7 +16343,7 @@
       </p:sp>
       <p:sp>
         <p:nvSpPr>
-          <p:cNvPr id="362" name="CustomShape 32"/>
+          <p:cNvPr id="367" name="CustomShape 32"/>
           <p:cNvSpPr/>
           <p:nvPr/>
         </p:nvSpPr>
@@ -16082,7 +16380,7 @@
       </p:sp>
       <p:sp>
         <p:nvSpPr>
-          <p:cNvPr id="363" name="CustomShape 33"/>
+          <p:cNvPr id="368" name="CustomShape 33"/>
           <p:cNvSpPr/>
           <p:nvPr/>
         </p:nvSpPr>
@@ -16137,7 +16435,7 @@
       </p:sp>
       <p:sp>
         <p:nvSpPr>
-          <p:cNvPr id="364" name="CustomShape 34"/>
+          <p:cNvPr id="369" name="CustomShape 34"/>
           <p:cNvSpPr/>
           <p:nvPr/>
         </p:nvSpPr>
@@ -16174,7 +16472,7 @@
       </p:sp>
       <p:sp>
         <p:nvSpPr>
-          <p:cNvPr id="365" name="CustomShape 35"/>
+          <p:cNvPr id="370" name="CustomShape 35"/>
           <p:cNvSpPr/>
           <p:nvPr/>
         </p:nvSpPr>
@@ -16211,7 +16509,7 @@
       </p:sp>
       <p:sp>
         <p:nvSpPr>
-          <p:cNvPr id="366" name="CustomShape 36"/>
+          <p:cNvPr id="371" name="CustomShape 36"/>
           <p:cNvSpPr/>
           <p:nvPr/>
         </p:nvSpPr>
@@ -16248,7 +16546,7 @@
       </p:sp>
       <p:sp>
         <p:nvSpPr>
-          <p:cNvPr id="367" name="CustomShape 37"/>
+          <p:cNvPr id="372" name="CustomShape 37"/>
           <p:cNvSpPr/>
           <p:nvPr/>
         </p:nvSpPr>
@@ -16285,7 +16583,7 @@
       </p:sp>
       <p:sp>
         <p:nvSpPr>
-          <p:cNvPr id="368" name="CustomShape 38"/>
+          <p:cNvPr id="373" name="CustomShape 38"/>
           <p:cNvSpPr/>
           <p:nvPr/>
         </p:nvSpPr>
@@ -16397,7 +16695,7 @@
       </p:sp>
       <p:sp>
         <p:nvSpPr>
-          <p:cNvPr id="369" name="CustomShape 39"/>
+          <p:cNvPr id="374" name="CustomShape 39"/>
           <p:cNvSpPr/>
           <p:nvPr/>
         </p:nvSpPr>
@@ -16437,7 +16735,7 @@
       </p:sp>
       <p:sp>
         <p:nvSpPr>
-          <p:cNvPr id="370" name="CustomShape 40"/>
+          <p:cNvPr id="375" name="CustomShape 40"/>
           <p:cNvSpPr/>
           <p:nvPr/>
         </p:nvSpPr>
@@ -16477,7 +16775,7 @@
       </p:sp>
       <p:sp>
         <p:nvSpPr>
-          <p:cNvPr id="371" name="CustomShape 41"/>
+          <p:cNvPr id="376" name="CustomShape 41"/>
           <p:cNvSpPr/>
           <p:nvPr/>
         </p:nvSpPr>
@@ -16517,7 +16815,7 @@
       </p:sp>
       <p:sp>
         <p:nvSpPr>
-          <p:cNvPr id="372" name="CustomShape 42"/>
+          <p:cNvPr id="377" name="CustomShape 42"/>
           <p:cNvSpPr/>
           <p:nvPr/>
         </p:nvSpPr>
@@ -16557,7 +16855,7 @@
       </p:sp>
       <p:sp>
         <p:nvSpPr>
-          <p:cNvPr id="373" name="CustomShape 43"/>
+          <p:cNvPr id="378" name="CustomShape 43"/>
           <p:cNvSpPr/>
           <p:nvPr/>
         </p:nvSpPr>
@@ -16597,7 +16895,7 @@
       </p:sp>
       <p:sp>
         <p:nvSpPr>
-          <p:cNvPr id="374" name="CustomShape 44"/>
+          <p:cNvPr id="379" name="CustomShape 44"/>
           <p:cNvSpPr/>
           <p:nvPr/>
         </p:nvSpPr>
@@ -16647,7 +16945,7 @@
       </p:sp>
       <p:sp>
         <p:nvSpPr>
-          <p:cNvPr id="375" name="CustomShape 45"/>
+          <p:cNvPr id="380" name="CustomShape 45"/>
           <p:cNvSpPr/>
           <p:nvPr/>
         </p:nvSpPr>
@@ -16697,7 +16995,7 @@
       </p:sp>
       <p:sp>
         <p:nvSpPr>
-          <p:cNvPr id="376" name="CustomShape 46"/>
+          <p:cNvPr id="381" name="CustomShape 46"/>
           <p:cNvSpPr/>
           <p:nvPr/>
         </p:nvSpPr>
@@ -16747,7 +17045,7 @@
       </p:sp>
       <p:sp>
         <p:nvSpPr>
-          <p:cNvPr id="377" name="CustomShape 47"/>
+          <p:cNvPr id="382" name="CustomShape 47"/>
           <p:cNvSpPr/>
           <p:nvPr/>
         </p:nvSpPr>
@@ -16797,7 +17095,7 @@
       </p:sp>
       <p:sp>
         <p:nvSpPr>
-          <p:cNvPr id="378" name="CustomShape 48"/>
+          <p:cNvPr id="383" name="CustomShape 48"/>
           <p:cNvSpPr/>
           <p:nvPr/>
         </p:nvSpPr>
@@ -16834,7 +17132,7 @@
       </p:sp>
       <p:sp>
         <p:nvSpPr>
-          <p:cNvPr id="379" name="CustomShape 49"/>
+          <p:cNvPr id="384" name="CustomShape 49"/>
           <p:cNvSpPr/>
           <p:nvPr/>
         </p:nvSpPr>
@@ -16884,7 +17182,7 @@
       </p:sp>
       <p:sp>
         <p:nvSpPr>
-          <p:cNvPr id="380" name="CustomShape 50"/>
+          <p:cNvPr id="385" name="CustomShape 50"/>
           <p:cNvSpPr/>
           <p:nvPr/>
         </p:nvSpPr>
@@ -16934,7 +17232,7 @@
       </p:sp>
       <p:sp>
         <p:nvSpPr>
-          <p:cNvPr id="381" name="CustomShape 51"/>
+          <p:cNvPr id="386" name="CustomShape 51"/>
           <p:cNvSpPr/>
           <p:nvPr/>
         </p:nvSpPr>
@@ -17014,7 +17312,7 @@
       </p:grpSpPr>
       <p:sp>
         <p:nvSpPr>
-          <p:cNvPr id="382" name="TextShape 1"/>
+          <p:cNvPr id="387" name="TextShape 1"/>
           <p:cNvSpPr txBox="1"/>
           <p:nvPr/>
         </p:nvSpPr>
@@ -17062,7 +17360,7 @@
       </p:sp>
       <p:sp>
         <p:nvSpPr>
-          <p:cNvPr id="383" name="TextShape 2"/>
+          <p:cNvPr id="388" name="TextShape 2"/>
           <p:cNvSpPr txBox="1"/>
           <p:nvPr/>
         </p:nvSpPr>
@@ -17118,7 +17416,7 @@
       </p:sp>
       <p:sp>
         <p:nvSpPr>
-          <p:cNvPr id="384" name="CustomShape 3"/>
+          <p:cNvPr id="389" name="CustomShape 3"/>
           <p:cNvSpPr/>
           <p:nvPr/>
         </p:nvSpPr>
@@ -17155,7 +17453,7 @@
       </p:sp>
       <p:sp>
         <p:nvSpPr>
-          <p:cNvPr id="385" name="CustomShape 4"/>
+          <p:cNvPr id="390" name="CustomShape 4"/>
           <p:cNvSpPr/>
           <p:nvPr/>
         </p:nvSpPr>
@@ -17205,7 +17503,7 @@
       </p:sp>
       <p:sp>
         <p:nvSpPr>
-          <p:cNvPr id="386" name="CustomShape 5"/>
+          <p:cNvPr id="391" name="CustomShape 5"/>
           <p:cNvSpPr/>
           <p:nvPr/>
         </p:nvSpPr>
@@ -17356,7 +17654,7 @@
       </p:sp>
       <p:sp>
         <p:nvSpPr>
-          <p:cNvPr id="387" name="CustomShape 6"/>
+          <p:cNvPr id="392" name="CustomShape 6"/>
           <p:cNvSpPr/>
           <p:nvPr/>
         </p:nvSpPr>
@@ -17392,7 +17690,7 @@
       </p:sp>
       <p:sp>
         <p:nvSpPr>
-          <p:cNvPr id="388" name="CustomShape 7"/>
+          <p:cNvPr id="393" name="CustomShape 7"/>
           <p:cNvSpPr/>
           <p:nvPr/>
         </p:nvSpPr>
@@ -17442,7 +17740,7 @@
       </p:sp>
       <p:sp>
         <p:nvSpPr>
-          <p:cNvPr id="389" name="CustomShape 8"/>
+          <p:cNvPr id="394" name="CustomShape 8"/>
           <p:cNvSpPr/>
           <p:nvPr/>
         </p:nvSpPr>
@@ -17623,7 +17921,7 @@
       </p:grpSpPr>
       <p:sp>
         <p:nvSpPr>
-          <p:cNvPr id="390" name="CustomShape 1"/>
+          <p:cNvPr id="395" name="CustomShape 1"/>
           <p:cNvSpPr/>
           <p:nvPr/>
         </p:nvSpPr>
@@ -17660,7 +17958,7 @@
       </p:sp>
       <p:sp>
         <p:nvSpPr>
-          <p:cNvPr id="391" name="CustomShape 2"/>
+          <p:cNvPr id="396" name="CustomShape 2"/>
           <p:cNvSpPr/>
           <p:nvPr/>
         </p:nvSpPr>
@@ -17710,7 +18008,7 @@
       </p:sp>
       <p:sp>
         <p:nvSpPr>
-          <p:cNvPr id="392" name="CustomShape 3"/>
+          <p:cNvPr id="397" name="CustomShape 3"/>
           <p:cNvSpPr/>
           <p:nvPr/>
         </p:nvSpPr>
@@ -17837,7 +18135,7 @@
       </p:sp>
       <p:sp>
         <p:nvSpPr>
-          <p:cNvPr id="393" name="CustomShape 4"/>
+          <p:cNvPr id="398" name="CustomShape 4"/>
           <p:cNvSpPr/>
           <p:nvPr/>
         </p:nvSpPr>
@@ -17873,7 +18171,7 @@
       </p:sp>
       <p:sp>
         <p:nvSpPr>
-          <p:cNvPr id="394" name="CustomShape 5"/>
+          <p:cNvPr id="399" name="CustomShape 5"/>
           <p:cNvSpPr/>
           <p:nvPr/>
         </p:nvSpPr>
@@ -17923,7 +18221,7 @@
       </p:sp>
       <p:sp>
         <p:nvSpPr>
-          <p:cNvPr id="395" name="CustomShape 6"/>
+          <p:cNvPr id="400" name="CustomShape 6"/>
           <p:cNvSpPr/>
           <p:nvPr/>
         </p:nvSpPr>
@@ -18098,7 +18396,7 @@
       </p:sp>
       <p:sp>
         <p:nvSpPr>
-          <p:cNvPr id="396" name="CustomShape 7"/>
+          <p:cNvPr id="401" name="CustomShape 7"/>
           <p:cNvSpPr/>
           <p:nvPr/>
         </p:nvSpPr>
@@ -18135,7 +18433,7 @@
       </p:sp>
       <p:sp>
         <p:nvSpPr>
-          <p:cNvPr id="397" name="CustomShape 8"/>
+          <p:cNvPr id="402" name="CustomShape 8"/>
           <p:cNvSpPr/>
           <p:nvPr/>
         </p:nvSpPr>
@@ -18262,7 +18560,7 @@
       </p:sp>
       <p:sp>
         <p:nvSpPr>
-          <p:cNvPr id="398" name="CustomShape 9"/>
+          <p:cNvPr id="403" name="CustomShape 9"/>
           <p:cNvSpPr/>
           <p:nvPr/>
         </p:nvSpPr>
@@ -18342,7 +18640,7 @@
       </p:grpSpPr>
       <p:sp>
         <p:nvSpPr>
-          <p:cNvPr id="399" name="TextShape 1"/>
+          <p:cNvPr id="404" name="TextShape 1"/>
           <p:cNvSpPr txBox="1"/>
           <p:nvPr/>
         </p:nvSpPr>
@@ -18377,47 +18675,7 @@
                 <a:latin typeface="Arial"/>
                 <a:ea typeface="Verdana"/>
               </a:rPr>
-              <a:t>Dictio</a:t>
-            </a:r>
-            <a:r>
-              <a:rPr b="0" lang="en-GB" sz="2800" spc="-1" strike="noStrike">
-                <a:solidFill>
-                  <a:srgbClr val="003088"/>
-                </a:solidFill>
-                <a:latin typeface="Arial"/>
-                <a:ea typeface="Verdana"/>
-              </a:rPr>
-              <a:t>naries </a:t>
-            </a:r>
-            <a:r>
-              <a:rPr b="0" lang="en-GB" sz="2800" spc="-1" strike="noStrike">
-                <a:solidFill>
-                  <a:srgbClr val="003088"/>
-                </a:solidFill>
-                <a:latin typeface="Arial"/>
-                <a:ea typeface="Verdana"/>
-              </a:rPr>
-              <a:t>define</a:t>
-            </a:r>
-            <a:r>
-              <a:rPr b="0" lang="en-GB" sz="2800" spc="-1" strike="noStrike">
-                <a:solidFill>
-                  <a:srgbClr val="003088"/>
-                </a:solidFill>
-                <a:latin typeface="Arial"/>
-                <a:ea typeface="Verdana"/>
-              </a:rPr>
-              <a:t>d in </a:t>
-            </a:r>
-            <a:r>
-              <a:rPr b="0" lang="en-GB" sz="2800" spc="-1" strike="noStrike">
-                <a:solidFill>
-                  <a:srgbClr val="003088"/>
-                </a:solidFill>
-                <a:latin typeface="Arial"/>
-                <a:ea typeface="Verdana"/>
-              </a:rPr>
-              <a:t>GUI</a:t>
+              <a:t>Dictionaries defined in GUI</a:t>
             </a:r>
             <a:endParaRPr b="0" lang="en-US" sz="2800" spc="-1" strike="noStrike">
               <a:solidFill>
@@ -18430,7 +18688,7 @@
       </p:sp>
       <p:sp>
         <p:nvSpPr>
-          <p:cNvPr id="400" name="CustomShape 2"/>
+          <p:cNvPr id="405" name="CustomShape 2"/>
           <p:cNvSpPr/>
           <p:nvPr/>
         </p:nvSpPr>
@@ -18466,7 +18724,7 @@
       </p:sp>
       <p:sp>
         <p:nvSpPr>
-          <p:cNvPr id="401" name="CustomShape 3"/>
+          <p:cNvPr id="406" name="CustomShape 3"/>
           <p:cNvSpPr/>
           <p:nvPr/>
         </p:nvSpPr>
@@ -18516,7 +18774,7 @@
       </p:sp>
       <p:sp>
         <p:nvSpPr>
-          <p:cNvPr id="402" name="CustomShape 4"/>
+          <p:cNvPr id="407" name="CustomShape 4"/>
           <p:cNvSpPr/>
           <p:nvPr/>
         </p:nvSpPr>
@@ -18619,7 +18877,7 @@
       </p:sp>
       <p:sp>
         <p:nvSpPr>
-          <p:cNvPr id="403" name="CustomShape 5"/>
+          <p:cNvPr id="408" name="CustomShape 5"/>
           <p:cNvSpPr/>
           <p:nvPr/>
         </p:nvSpPr>
@@ -18656,7 +18914,7 @@
       </p:sp>
       <p:sp>
         <p:nvSpPr>
-          <p:cNvPr id="404" name="CustomShape 6"/>
+          <p:cNvPr id="409" name="CustomShape 6"/>
           <p:cNvSpPr/>
           <p:nvPr/>
         </p:nvSpPr>
@@ -18706,7 +18964,7 @@
       </p:sp>
       <p:sp>
         <p:nvSpPr>
-          <p:cNvPr id="405" name="CustomShape 7"/>
+          <p:cNvPr id="410" name="CustomShape 7"/>
           <p:cNvSpPr/>
           <p:nvPr/>
         </p:nvSpPr>
@@ -18815,7 +19073,7 @@
       </p:grpSpPr>
       <p:sp>
         <p:nvSpPr>
-          <p:cNvPr id="406" name="TextShape 1"/>
+          <p:cNvPr id="411" name="TextShape 1"/>
           <p:cNvSpPr txBox="1"/>
           <p:nvPr/>
         </p:nvSpPr>
@@ -18863,7 +19121,7 @@
       </p:sp>
       <p:sp>
         <p:nvSpPr>
-          <p:cNvPr id="407" name="CustomShape 2"/>
+          <p:cNvPr id="412" name="CustomShape 2"/>
           <p:cNvSpPr/>
           <p:nvPr/>
         </p:nvSpPr>
@@ -18902,14 +19160,14 @@
       </p:sp>
       <p:sp>
         <p:nvSpPr>
-          <p:cNvPr id="408" name="CustomShape 3"/>
-          <p:cNvSpPr/>
-          <p:nvPr/>
-        </p:nvSpPr>
-        <p:spPr>
-          <a:xfrm>
-            <a:off x="1596600" y="936720"/>
-            <a:ext cx="2015280" cy="851400"/>
+          <p:cNvPr id="413" name="CustomShape 3"/>
+          <p:cNvSpPr/>
+          <p:nvPr/>
+        </p:nvSpPr>
+        <p:spPr>
+          <a:xfrm>
+            <a:off x="1698120" y="936720"/>
+            <a:ext cx="1397880" cy="567360"/>
           </a:xfrm>
           <a:prstGeom prst="rect">
             <a:avLst/>
@@ -18942,7 +19200,7 @@
                 </a:solidFill>
                 <a:latin typeface="Arial"/>
               </a:rPr>
-              <a:t>i &gt; length of BEAM_DISPLAY?</a:t>
+              <a:t>i &gt; length of widget_dict?</a:t>
             </a:r>
             <a:endParaRPr b="0" lang="en-GB" sz="1600" spc="-1" strike="noStrike">
               <a:latin typeface="Arial"/>
@@ -18962,7 +19220,7 @@
       </p:sp>
       <p:sp>
         <p:nvSpPr>
-          <p:cNvPr id="409" name="CustomShape 4"/>
+          <p:cNvPr id="414" name="CustomShape 4"/>
           <p:cNvSpPr/>
           <p:nvPr/>
         </p:nvSpPr>
@@ -18999,7 +19257,7 @@
       </p:sp>
       <p:sp>
         <p:nvSpPr>
-          <p:cNvPr id="410" name="CustomShape 5"/>
+          <p:cNvPr id="415" name="CustomShape 5"/>
           <p:cNvSpPr/>
           <p:nvPr/>
         </p:nvSpPr>
@@ -19043,8 +19301,27 @@
                   <a:srgbClr val="000000"/>
                 </a:solidFill>
                 <a:latin typeface="Arial"/>
-              </a:rPr>
-              <a:t>Set widget variable to BEAM_SETUP[i]["widget"]</a:t>
+                <a:ea typeface="Noto Sans CJK SC"/>
+              </a:rPr>
+              <a:t>Set widget variable to </a:t>
+            </a:r>
+            <a:r>
+              <a:rPr b="0" lang="en-GB" sz="1600" spc="-1" strike="noStrike">
+                <a:solidFill>
+                  <a:srgbClr val="000000"/>
+                </a:solidFill>
+                <a:latin typeface="Arial"/>
+              </a:rPr>
+              <a:t>widget_dict</a:t>
+            </a:r>
+            <a:r>
+              <a:rPr b="0" lang="en-US" sz="1600" spc="-1" strike="noStrike">
+                <a:solidFill>
+                  <a:srgbClr val="000000"/>
+                </a:solidFill>
+                <a:latin typeface="Arial"/>
+              </a:rPr>
+              <a:t>[i]["widget"]</a:t>
             </a:r>
             <a:endParaRPr b="0" lang="en-GB" sz="1600" spc="-1" strike="noStrike">
               <a:latin typeface="Arial"/>
@@ -19054,7 +19331,7 @@
       </p:sp>
       <p:sp>
         <p:nvSpPr>
-          <p:cNvPr id="411" name="CustomShape 6"/>
+          <p:cNvPr id="416" name="CustomShape 6"/>
           <p:cNvSpPr/>
           <p:nvPr/>
         </p:nvSpPr>
@@ -19091,7 +19368,7 @@
       </p:sp>
       <p:sp>
         <p:nvSpPr>
-          <p:cNvPr id="412" name="CustomShape 7"/>
+          <p:cNvPr id="417" name="CustomShape 7"/>
           <p:cNvSpPr/>
           <p:nvPr/>
         </p:nvSpPr>
@@ -19135,18 +19412,47 @@
                   <a:srgbClr val="000000"/>
                 </a:solidFill>
                 <a:latin typeface="Arial"/>
-              </a:rPr>
-              <a:t>Set args to BEAM_SETUP[i][“options"]</a:t>
+                <a:ea typeface="Noto Sans CJK SC"/>
+              </a:rPr>
+              <a:t>Set args to </a:t>
             </a:r>
             <a:endParaRPr b="0" lang="en-GB" sz="1600" spc="-1" strike="noStrike">
               <a:latin typeface="Arial"/>
             </a:endParaRPr>
           </a:p>
-        </p:txBody>
-      </p:sp>
-      <p:sp>
-        <p:nvSpPr>
-          <p:cNvPr id="413" name="CustomShape 8"/>
+          <a:p>
+            <a:pPr>
+              <a:lnSpc>
+                <a:spcPct val="100000"/>
+              </a:lnSpc>
+            </a:pPr>
+            <a:r>
+              <a:rPr b="0" lang="en-GB" sz="1600" spc="-1" strike="noStrike">
+                <a:solidFill>
+                  <a:srgbClr val="000000"/>
+                </a:solidFill>
+                <a:latin typeface="Arial"/>
+              </a:rPr>
+              <a:t>widget_dict</a:t>
+            </a:r>
+            <a:r>
+              <a:rPr b="0" lang="en-US" sz="1600" spc="-1" strike="noStrike">
+                <a:solidFill>
+                  <a:srgbClr val="000000"/>
+                </a:solidFill>
+                <a:latin typeface="Arial"/>
+              </a:rPr>
+              <a:t>[i]["options"]</a:t>
+            </a:r>
+            <a:endParaRPr b="0" lang="en-GB" sz="1600" spc="-1" strike="noStrike">
+              <a:latin typeface="Arial"/>
+            </a:endParaRPr>
+          </a:p>
+        </p:txBody>
+      </p:sp>
+      <p:sp>
+        <p:nvSpPr>
+          <p:cNvPr id="418" name="CustomShape 8"/>
           <p:cNvSpPr/>
           <p:nvPr/>
         </p:nvSpPr>
@@ -19201,7 +19507,7 @@
       </p:sp>
       <p:sp>
         <p:nvSpPr>
-          <p:cNvPr id="414" name="CustomShape 9"/>
+          <p:cNvPr id="419" name="CustomShape 9"/>
           <p:cNvSpPr/>
           <p:nvPr/>
         </p:nvSpPr>
@@ -19256,7 +19562,7 @@
       </p:sp>
       <p:sp>
         <p:nvSpPr>
-          <p:cNvPr id="415" name="CustomShape 10"/>
+          <p:cNvPr id="420" name="CustomShape 10"/>
           <p:cNvSpPr/>
           <p:nvPr/>
         </p:nvSpPr>
@@ -19311,7 +19617,7 @@
       </p:sp>
       <p:sp>
         <p:nvSpPr>
-          <p:cNvPr id="416" name="CustomShape 11"/>
+          <p:cNvPr id="421" name="CustomShape 11"/>
           <p:cNvSpPr/>
           <p:nvPr/>
         </p:nvSpPr>
@@ -19348,7 +19654,7 @@
       </p:sp>
       <p:sp>
         <p:nvSpPr>
-          <p:cNvPr id="417" name="CustomShape 12"/>
+          <p:cNvPr id="422" name="CustomShape 12"/>
           <p:cNvSpPr/>
           <p:nvPr/>
         </p:nvSpPr>
@@ -19385,7 +19691,7 @@
       </p:sp>
       <p:sp>
         <p:nvSpPr>
-          <p:cNvPr id="418" name="CustomShape 13"/>
+          <p:cNvPr id="423" name="CustomShape 13"/>
           <p:cNvSpPr/>
           <p:nvPr/>
         </p:nvSpPr>
@@ -19422,7 +19728,7 @@
       </p:sp>
       <p:sp>
         <p:nvSpPr>
-          <p:cNvPr id="419" name="Line 14"/>
+          <p:cNvPr id="424" name="Line 14"/>
           <p:cNvSpPr/>
           <p:nvPr/>
         </p:nvSpPr>
@@ -19451,7 +19757,7 @@
       </p:sp>
       <p:sp>
         <p:nvSpPr>
-          <p:cNvPr id="420" name="Line 15"/>
+          <p:cNvPr id="425" name="Line 15"/>
           <p:cNvSpPr/>
           <p:nvPr/>
         </p:nvSpPr>
@@ -19480,7 +19786,7 @@
       </p:sp>
       <p:sp>
         <p:nvSpPr>
-          <p:cNvPr id="421" name="CustomShape 16"/>
+          <p:cNvPr id="426" name="CustomShape 16"/>
           <p:cNvSpPr/>
           <p:nvPr/>
         </p:nvSpPr>
@@ -19517,7 +19823,7 @@
       </p:sp>
       <p:sp>
         <p:nvSpPr>
-          <p:cNvPr id="422" name="CustomShape 17"/>
+          <p:cNvPr id="427" name="CustomShape 17"/>
           <p:cNvSpPr/>
           <p:nvPr/>
         </p:nvSpPr>
@@ -19567,7 +19873,7 @@
       </p:sp>
       <p:sp>
         <p:nvSpPr>
-          <p:cNvPr id="423" name="CustomShape 18"/>
+          <p:cNvPr id="428" name="CustomShape 18"/>
           <p:cNvSpPr/>
           <p:nvPr/>
         </p:nvSpPr>
@@ -19617,7 +19923,7 @@
       </p:sp>
       <p:sp>
         <p:nvSpPr>
-          <p:cNvPr id="424" name="CustomShape 19"/>
+          <p:cNvPr id="429" name="CustomShape 19"/>
           <p:cNvSpPr/>
           <p:nvPr/>
         </p:nvSpPr>
@@ -19654,14 +19960,14 @@
       </p:sp>
       <p:sp>
         <p:nvSpPr>
-          <p:cNvPr id="425" name="CustomShape 20"/>
-          <p:cNvSpPr/>
-          <p:nvPr/>
-        </p:nvSpPr>
-        <p:spPr>
-          <a:xfrm>
-            <a:off x="4213440" y="1086480"/>
-            <a:ext cx="987480" cy="335160"/>
+          <p:cNvPr id="430" name="CustomShape 20"/>
+          <p:cNvSpPr/>
+          <p:nvPr/>
+        </p:nvSpPr>
+        <p:spPr>
+          <a:xfrm>
+            <a:off x="4285440" y="864000"/>
+            <a:ext cx="1762560" cy="577800"/>
           </a:xfrm>
           <a:prstGeom prst="rect">
             <a:avLst/>
@@ -19699,7 +20005,7 @@
                 </a:solidFill>
                 <a:latin typeface="Arial"/>
               </a:rPr>
-              <a:t>Exit loop</a:t>
+              <a:t>Return input_list and widget_list</a:t>
             </a:r>
             <a:endParaRPr b="0" lang="en-GB" sz="1600" spc="-1" strike="noStrike">
               <a:latin typeface="Arial"/>
@@ -19707,32 +20013,9 @@
           </a:p>
         </p:txBody>
       </p:sp>
-      <p:pic>
-        <p:nvPicPr>
-          <p:cNvPr id="426" name="Picture 31" descr=""/>
-          <p:cNvPicPr/>
-          <p:nvPr/>
-        </p:nvPicPr>
-        <p:blipFill>
-          <a:blip r:embed="rId1"/>
-          <a:stretch/>
-        </p:blipFill>
-        <p:spPr>
-          <a:xfrm>
-            <a:off x="5844600" y="2504160"/>
-            <a:ext cx="4866840" cy="1571400"/>
-          </a:xfrm>
-          <a:prstGeom prst="rect">
-            <a:avLst/>
-          </a:prstGeom>
-          <a:ln>
-            <a:noFill/>
-          </a:ln>
-        </p:spPr>
-      </p:pic>
-      <p:sp>
-        <p:nvSpPr>
-          <p:cNvPr id="427" name="CustomShape 21"/>
+      <p:sp>
+        <p:nvSpPr>
+          <p:cNvPr id="431" name="CustomShape 21"/>
           <p:cNvSpPr/>
           <p:nvPr/>
         </p:nvSpPr>
@@ -19771,7 +20054,7 @@
       </p:sp>
       <p:sp>
         <p:nvSpPr>
-          <p:cNvPr id="428" name="CustomShape 22"/>
+          <p:cNvPr id="432" name="CustomShape 22"/>
           <p:cNvSpPr/>
           <p:nvPr/>
         </p:nvSpPr>
@@ -19831,7 +20114,7 @@
       </p:sp>
       <p:sp>
         <p:nvSpPr>
-          <p:cNvPr id="429" name="CustomShape 23"/>
+          <p:cNvPr id="433" name="CustomShape 23"/>
           <p:cNvSpPr/>
           <p:nvPr/>
         </p:nvSpPr>
@@ -19886,7 +20169,7 @@
       </p:sp>
       <p:sp>
         <p:nvSpPr>
-          <p:cNvPr id="430" name="CustomShape 24"/>
+          <p:cNvPr id="434" name="CustomShape 24"/>
           <p:cNvSpPr/>
           <p:nvPr/>
         </p:nvSpPr>
@@ -19923,7 +20206,7 @@
       </p:sp>
       <p:sp>
         <p:nvSpPr>
-          <p:cNvPr id="431" name="CustomShape 25"/>
+          <p:cNvPr id="435" name="CustomShape 25"/>
           <p:cNvSpPr/>
           <p:nvPr/>
         </p:nvSpPr>
@@ -19960,7 +20243,7 @@
       </p:sp>
       <p:sp>
         <p:nvSpPr>
-          <p:cNvPr id="432" name="CustomShape 26"/>
+          <p:cNvPr id="436" name="CustomShape 26"/>
           <p:cNvSpPr/>
           <p:nvPr/>
         </p:nvSpPr>
@@ -19997,7 +20280,7 @@
       </p:sp>
       <p:sp>
         <p:nvSpPr>
-          <p:cNvPr id="433" name="Line 27"/>
+          <p:cNvPr id="437" name="Line 27"/>
           <p:cNvSpPr/>
           <p:nvPr/>
         </p:nvSpPr>
@@ -20026,7 +20309,7 @@
       </p:sp>
       <p:sp>
         <p:nvSpPr>
-          <p:cNvPr id="434" name="CustomShape 28"/>
+          <p:cNvPr id="438" name="CustomShape 28"/>
           <p:cNvSpPr/>
           <p:nvPr/>
         </p:nvSpPr>
@@ -20063,7 +20346,7 @@
       </p:sp>
       <p:sp>
         <p:nvSpPr>
-          <p:cNvPr id="435" name="CustomShape 29"/>
+          <p:cNvPr id="439" name="CustomShape 29"/>
           <p:cNvSpPr/>
           <p:nvPr/>
         </p:nvSpPr>
@@ -20113,7 +20396,7 @@
       </p:sp>
       <p:sp>
         <p:nvSpPr>
-          <p:cNvPr id="436" name="CustomShape 30"/>
+          <p:cNvPr id="440" name="CustomShape 30"/>
           <p:cNvSpPr/>
           <p:nvPr/>
         </p:nvSpPr>
@@ -20161,6 +20444,29 @@
           </a:p>
         </p:txBody>
       </p:sp>
+      <p:pic>
+        <p:nvPicPr>
+          <p:cNvPr id="441" name="" descr=""/>
+          <p:cNvPicPr/>
+          <p:nvPr/>
+        </p:nvPicPr>
+        <p:blipFill>
+          <a:blip r:embed="rId1"/>
+          <a:stretch/>
+        </p:blipFill>
+        <p:spPr>
+          <a:xfrm>
+            <a:off x="5616000" y="2016000"/>
+            <a:ext cx="5114520" cy="1647360"/>
+          </a:xfrm>
+          <a:prstGeom prst="rect">
+            <a:avLst/>
+          </a:prstGeom>
+          <a:ln>
+            <a:noFill/>
+          </a:ln>
+        </p:spPr>
+      </p:pic>
     </p:spTree>
   </p:cSld>
   <mc:AlternateContent>
@@ -20193,7 +20499,7 @@
       </p:grpSpPr>
       <p:sp>
         <p:nvSpPr>
-          <p:cNvPr id="437" name="TextShape 1"/>
+          <p:cNvPr id="442" name="TextShape 1"/>
           <p:cNvSpPr txBox="1"/>
           <p:nvPr/>
         </p:nvSpPr>
@@ -20228,7 +20534,97 @@
                 <a:latin typeface="Arial"/>
                 <a:ea typeface="Verdana"/>
               </a:rPr>
-              <a:t>Key functions – choosing element settings</a:t>
+              <a:t>Key </a:t>
+            </a:r>
+            <a:r>
+              <a:rPr b="0" lang="en-GB" sz="2800" spc="-1" strike="noStrike">
+                <a:solidFill>
+                  <a:srgbClr val="003088"/>
+                </a:solidFill>
+                <a:latin typeface="Arial"/>
+                <a:ea typeface="Verdana"/>
+              </a:rPr>
+              <a:t>functi</a:t>
+            </a:r>
+            <a:r>
+              <a:rPr b="0" lang="en-GB" sz="2800" spc="-1" strike="noStrike">
+                <a:solidFill>
+                  <a:srgbClr val="003088"/>
+                </a:solidFill>
+                <a:latin typeface="Arial"/>
+                <a:ea typeface="Verdana"/>
+              </a:rPr>
+              <a:t>ons </a:t>
+            </a:r>
+            <a:r>
+              <a:rPr b="0" lang="en-GB" sz="2800" spc="-1" strike="noStrike">
+                <a:solidFill>
+                  <a:srgbClr val="003088"/>
+                </a:solidFill>
+                <a:latin typeface="Arial"/>
+                <a:ea typeface="Verdana"/>
+              </a:rPr>
+              <a:t>– </a:t>
+            </a:r>
+            <a:r>
+              <a:rPr b="0" lang="en-GB" sz="2800" spc="-1" strike="noStrike">
+                <a:solidFill>
+                  <a:srgbClr val="003088"/>
+                </a:solidFill>
+                <a:latin typeface="Arial"/>
+                <a:ea typeface="Verdana"/>
+              </a:rPr>
+              <a:t>choo</a:t>
+            </a:r>
+            <a:r>
+              <a:rPr b="0" lang="en-GB" sz="2800" spc="-1" strike="noStrike">
+                <a:solidFill>
+                  <a:srgbClr val="003088"/>
+                </a:solidFill>
+                <a:latin typeface="Arial"/>
+                <a:ea typeface="Verdana"/>
+              </a:rPr>
+              <a:t>sing </a:t>
+            </a:r>
+            <a:r>
+              <a:rPr b="0" lang="en-GB" sz="2800" spc="-1" strike="noStrike">
+                <a:solidFill>
+                  <a:srgbClr val="003088"/>
+                </a:solidFill>
+                <a:latin typeface="Arial"/>
+                <a:ea typeface="Verdana"/>
+              </a:rPr>
+              <a:t>elem</a:t>
+            </a:r>
+            <a:r>
+              <a:rPr b="0" lang="en-GB" sz="2800" spc="-1" strike="noStrike">
+                <a:solidFill>
+                  <a:srgbClr val="003088"/>
+                </a:solidFill>
+                <a:latin typeface="Arial"/>
+                <a:ea typeface="Verdana"/>
+              </a:rPr>
+              <a:t>ent </a:t>
+            </a:r>
+            <a:r>
+              <a:rPr b="0" lang="en-GB" sz="2800" spc="-1" strike="noStrike">
+                <a:solidFill>
+                  <a:srgbClr val="003088"/>
+                </a:solidFill>
+                <a:latin typeface="Arial"/>
+                <a:ea typeface="Verdana"/>
+              </a:rPr>
+              <a:t>settin</a:t>
+            </a:r>
+            <a:r>
+              <a:rPr b="0" lang="en-GB" sz="2800" spc="-1" strike="noStrike">
+                <a:solidFill>
+                  <a:srgbClr val="003088"/>
+                </a:solidFill>
+                <a:latin typeface="Arial"/>
+                <a:ea typeface="Verdana"/>
+              </a:rPr>
+              <a:t>gs</a:t>
             </a:r>
             <a:endParaRPr b="0" lang="en-US" sz="2800" spc="-1" strike="noStrike">
               <a:solidFill>
@@ -20241,7 +20637,7 @@
       </p:sp>
       <p:sp>
         <p:nvSpPr>
-          <p:cNvPr id="438" name="CustomShape 2"/>
+          <p:cNvPr id="443" name="CustomShape 2"/>
           <p:cNvSpPr/>
           <p:nvPr/>
         </p:nvSpPr>
@@ -20296,7 +20692,7 @@
       </p:sp>
       <p:sp>
         <p:nvSpPr>
-          <p:cNvPr id="439" name="CustomShape 3"/>
+          <p:cNvPr id="444" name="CustomShape 3"/>
           <p:cNvSpPr/>
           <p:nvPr/>
         </p:nvSpPr>
@@ -20351,7 +20747,7 @@
       </p:sp>
       <p:sp>
         <p:nvSpPr>
-          <p:cNvPr id="440" name="CustomShape 4"/>
+          <p:cNvPr id="445" name="CustomShape 4"/>
           <p:cNvSpPr/>
           <p:nvPr/>
         </p:nvSpPr>
@@ -20406,7 +20802,7 @@
       </p:sp>
       <p:sp>
         <p:nvSpPr>
-          <p:cNvPr id="441" name="CustomShape 5"/>
+          <p:cNvPr id="446" name="CustomShape 5"/>
           <p:cNvSpPr/>
           <p:nvPr/>
         </p:nvSpPr>
@@ -20461,7 +20857,7 @@
       </p:sp>
       <p:sp>
         <p:nvSpPr>
-          <p:cNvPr id="442" name="CustomShape 6"/>
+          <p:cNvPr id="447" name="CustomShape 6"/>
           <p:cNvSpPr/>
           <p:nvPr/>
         </p:nvSpPr>
@@ -20516,7 +20912,7 @@
       </p:sp>
       <p:sp>
         <p:nvSpPr>
-          <p:cNvPr id="443" name="CustomShape 7"/>
+          <p:cNvPr id="448" name="CustomShape 7"/>
           <p:cNvSpPr/>
           <p:nvPr/>
         </p:nvSpPr>
@@ -20571,7 +20967,7 @@
       </p:sp>
       <p:sp>
         <p:nvSpPr>
-          <p:cNvPr id="444" name="CustomShape 8"/>
+          <p:cNvPr id="449" name="CustomShape 8"/>
           <p:cNvSpPr/>
           <p:nvPr/>
         </p:nvSpPr>
@@ -20610,7 +21006,7 @@
       </p:sp>
       <p:sp>
         <p:nvSpPr>
-          <p:cNvPr id="445" name="CustomShape 9"/>
+          <p:cNvPr id="450" name="CustomShape 9"/>
           <p:cNvSpPr/>
           <p:nvPr/>
         </p:nvSpPr>
@@ -20670,7 +21066,7 @@
       </p:sp>
       <p:sp>
         <p:nvSpPr>
-          <p:cNvPr id="446" name="CustomShape 10"/>
+          <p:cNvPr id="451" name="CustomShape 10"/>
           <p:cNvSpPr/>
           <p:nvPr/>
         </p:nvSpPr>
@@ -20709,7 +21105,7 @@
       </p:sp>
       <p:sp>
         <p:nvSpPr>
-          <p:cNvPr id="447" name="CustomShape 11"/>
+          <p:cNvPr id="452" name="CustomShape 11"/>
           <p:cNvSpPr/>
           <p:nvPr/>
         </p:nvSpPr>
@@ -20769,7 +21165,7 @@
       </p:sp>
       <p:sp>
         <p:nvSpPr>
-          <p:cNvPr id="448" name="CustomShape 12"/>
+          <p:cNvPr id="453" name="CustomShape 12"/>
           <p:cNvSpPr/>
           <p:nvPr/>
         </p:nvSpPr>
@@ -20824,7 +21220,7 @@
       </p:sp>
       <p:sp>
         <p:nvSpPr>
-          <p:cNvPr id="449" name="CustomShape 13"/>
+          <p:cNvPr id="454" name="CustomShape 13"/>
           <p:cNvSpPr/>
           <p:nvPr/>
         </p:nvSpPr>
@@ -20879,7 +21275,7 @@
       </p:sp>
       <p:sp>
         <p:nvSpPr>
-          <p:cNvPr id="450" name="CustomShape 14"/>
+          <p:cNvPr id="455" name="CustomShape 14"/>
           <p:cNvSpPr/>
           <p:nvPr/>
         </p:nvSpPr>
@@ -20934,7 +21330,7 @@
       </p:sp>
       <p:sp>
         <p:nvSpPr>
-          <p:cNvPr id="451" name="CustomShape 15"/>
+          <p:cNvPr id="456" name="CustomShape 15"/>
           <p:cNvSpPr/>
           <p:nvPr/>
         </p:nvSpPr>
@@ -20989,7 +21385,7 @@
       </p:sp>
       <p:sp>
         <p:nvSpPr>
-          <p:cNvPr id="452" name="CustomShape 16"/>
+          <p:cNvPr id="457" name="CustomShape 16"/>
           <p:cNvSpPr/>
           <p:nvPr/>
         </p:nvSpPr>
@@ -21044,7 +21440,7 @@
       </p:sp>
       <p:sp>
         <p:nvSpPr>
-          <p:cNvPr id="453" name="CustomShape 17"/>
+          <p:cNvPr id="458" name="CustomShape 17"/>
           <p:cNvSpPr/>
           <p:nvPr/>
         </p:nvSpPr>
@@ -21099,7 +21495,7 @@
       </p:sp>
       <p:sp>
         <p:nvSpPr>
-          <p:cNvPr id="454" name="CustomShape 18"/>
+          <p:cNvPr id="459" name="CustomShape 18"/>
           <p:cNvSpPr/>
           <p:nvPr/>
         </p:nvSpPr>
@@ -21138,7 +21534,7 @@
       </p:sp>
       <p:sp>
         <p:nvSpPr>
-          <p:cNvPr id="455" name="CustomShape 19"/>
+          <p:cNvPr id="460" name="CustomShape 19"/>
           <p:cNvSpPr/>
           <p:nvPr/>
         </p:nvSpPr>
@@ -21198,7 +21594,7 @@
       </p:sp>
       <p:sp>
         <p:nvSpPr>
-          <p:cNvPr id="456" name="CustomShape 20"/>
+          <p:cNvPr id="461" name="CustomShape 20"/>
           <p:cNvSpPr/>
           <p:nvPr/>
         </p:nvSpPr>
@@ -21235,7 +21631,7 @@
       </p:sp>
       <p:sp>
         <p:nvSpPr>
-          <p:cNvPr id="457" name="CustomShape 21"/>
+          <p:cNvPr id="462" name="CustomShape 21"/>
           <p:cNvSpPr/>
           <p:nvPr/>
         </p:nvSpPr>
@@ -21272,7 +21668,7 @@
       </p:sp>
       <p:sp>
         <p:nvSpPr>
-          <p:cNvPr id="458" name="CustomShape 22"/>
+          <p:cNvPr id="463" name="CustomShape 22"/>
           <p:cNvSpPr/>
           <p:nvPr/>
         </p:nvSpPr>
@@ -21309,7 +21705,7 @@
       </p:sp>
       <p:sp>
         <p:nvSpPr>
-          <p:cNvPr id="459" name="CustomShape 23"/>
+          <p:cNvPr id="464" name="CustomShape 23"/>
           <p:cNvSpPr/>
           <p:nvPr/>
         </p:nvSpPr>
@@ -21346,7 +21742,7 @@
       </p:sp>
       <p:sp>
         <p:nvSpPr>
-          <p:cNvPr id="460" name="CustomShape 24"/>
+          <p:cNvPr id="465" name="CustomShape 24"/>
           <p:cNvSpPr/>
           <p:nvPr/>
         </p:nvSpPr>
@@ -21383,7 +21779,7 @@
       </p:sp>
       <p:sp>
         <p:nvSpPr>
-          <p:cNvPr id="461" name="CustomShape 25"/>
+          <p:cNvPr id="466" name="CustomShape 25"/>
           <p:cNvSpPr/>
           <p:nvPr/>
         </p:nvSpPr>
@@ -21420,7 +21816,7 @@
       </p:sp>
       <p:sp>
         <p:nvSpPr>
-          <p:cNvPr id="462" name="CustomShape 26"/>
+          <p:cNvPr id="467" name="CustomShape 26"/>
           <p:cNvSpPr/>
           <p:nvPr/>
         </p:nvSpPr>
@@ -21457,7 +21853,7 @@
       </p:sp>
       <p:sp>
         <p:nvSpPr>
-          <p:cNvPr id="463" name="CustomShape 27"/>
+          <p:cNvPr id="468" name="CustomShape 27"/>
           <p:cNvSpPr/>
           <p:nvPr/>
         </p:nvSpPr>
@@ -21500,7 +21896,7 @@
       </p:sp>
       <p:sp>
         <p:nvSpPr>
-          <p:cNvPr id="464" name="CustomShape 28"/>
+          <p:cNvPr id="469" name="CustomShape 28"/>
           <p:cNvSpPr/>
           <p:nvPr/>
         </p:nvSpPr>
@@ -21537,7 +21933,7 @@
       </p:sp>
       <p:sp>
         <p:nvSpPr>
-          <p:cNvPr id="465" name="CustomShape 29"/>
+          <p:cNvPr id="470" name="CustomShape 29"/>
           <p:cNvSpPr/>
           <p:nvPr/>
         </p:nvSpPr>
@@ -21580,7 +21976,7 @@
       </p:sp>
       <p:sp>
         <p:nvSpPr>
-          <p:cNvPr id="466" name="CustomShape 30"/>
+          <p:cNvPr id="471" name="CustomShape 30"/>
           <p:cNvSpPr/>
           <p:nvPr/>
         </p:nvSpPr>
@@ -21617,7 +22013,7 @@
       </p:sp>
       <p:sp>
         <p:nvSpPr>
-          <p:cNvPr id="467" name="CustomShape 31"/>
+          <p:cNvPr id="472" name="CustomShape 31"/>
           <p:cNvSpPr/>
           <p:nvPr/>
         </p:nvSpPr>
@@ -21654,7 +22050,7 @@
       </p:sp>
       <p:sp>
         <p:nvSpPr>
-          <p:cNvPr id="468" name="CustomShape 32"/>
+          <p:cNvPr id="473" name="CustomShape 32"/>
           <p:cNvSpPr/>
           <p:nvPr/>
         </p:nvSpPr>
@@ -21691,7 +22087,7 @@
       </p:sp>
       <p:sp>
         <p:nvSpPr>
-          <p:cNvPr id="469" name="CustomShape 33"/>
+          <p:cNvPr id="474" name="CustomShape 33"/>
           <p:cNvSpPr/>
           <p:nvPr/>
         </p:nvSpPr>
@@ -21728,7 +22124,7 @@
       </p:sp>
       <p:sp>
         <p:nvSpPr>
-          <p:cNvPr id="470" name="CustomShape 34"/>
+          <p:cNvPr id="475" name="CustomShape 34"/>
           <p:cNvSpPr/>
           <p:nvPr/>
         </p:nvSpPr>
@@ -21765,7 +22161,7 @@
       </p:sp>
       <p:sp>
         <p:nvSpPr>
-          <p:cNvPr id="471" name="CustomShape 35"/>
+          <p:cNvPr id="476" name="CustomShape 35"/>
           <p:cNvSpPr/>
           <p:nvPr/>
         </p:nvSpPr>
@@ -21802,7 +22198,7 @@
       </p:sp>
       <p:sp>
         <p:nvSpPr>
-          <p:cNvPr id="472" name="CustomShape 36"/>
+          <p:cNvPr id="477" name="CustomShape 36"/>
           <p:cNvSpPr/>
           <p:nvPr/>
         </p:nvSpPr>
@@ -21839,7 +22235,7 @@
       </p:sp>
       <p:sp>
         <p:nvSpPr>
-          <p:cNvPr id="473" name="CustomShape 37"/>
+          <p:cNvPr id="478" name="CustomShape 37"/>
           <p:cNvSpPr/>
           <p:nvPr/>
         </p:nvSpPr>
@@ -21876,7 +22272,7 @@
       </p:sp>
       <p:sp>
         <p:nvSpPr>
-          <p:cNvPr id="474" name="CustomShape 38"/>
+          <p:cNvPr id="479" name="CustomShape 38"/>
           <p:cNvSpPr/>
           <p:nvPr/>
         </p:nvSpPr>
@@ -21913,7 +22309,7 @@
       </p:sp>
       <p:sp>
         <p:nvSpPr>
-          <p:cNvPr id="475" name="CustomShape 39"/>
+          <p:cNvPr id="480" name="CustomShape 39"/>
           <p:cNvSpPr/>
           <p:nvPr/>
         </p:nvSpPr>
@@ -21950,7 +22346,7 @@
       </p:sp>
       <p:sp>
         <p:nvSpPr>
-          <p:cNvPr id="476" name="CustomShape 40"/>
+          <p:cNvPr id="481" name="CustomShape 40"/>
           <p:cNvSpPr/>
           <p:nvPr/>
         </p:nvSpPr>
@@ -22000,7 +22396,7 @@
       </p:sp>
       <p:sp>
         <p:nvSpPr>
-          <p:cNvPr id="477" name="CustomShape 41"/>
+          <p:cNvPr id="482" name="CustomShape 41"/>
           <p:cNvSpPr/>
           <p:nvPr/>
         </p:nvSpPr>
@@ -22050,7 +22446,7 @@
       </p:sp>
       <p:sp>
         <p:nvSpPr>
-          <p:cNvPr id="478" name="CustomShape 42"/>
+          <p:cNvPr id="483" name="CustomShape 42"/>
           <p:cNvSpPr/>
           <p:nvPr/>
         </p:nvSpPr>
@@ -22100,7 +22496,7 @@
       </p:sp>
       <p:sp>
         <p:nvSpPr>
-          <p:cNvPr id="479" name="CustomShape 43"/>
+          <p:cNvPr id="484" name="CustomShape 43"/>
           <p:cNvSpPr/>
           <p:nvPr/>
         </p:nvSpPr>
@@ -22150,7 +22546,7 @@
       </p:sp>
       <p:sp>
         <p:nvSpPr>
-          <p:cNvPr id="480" name="CustomShape 44"/>
+          <p:cNvPr id="485" name="CustomShape 44"/>
           <p:cNvSpPr/>
           <p:nvPr/>
         </p:nvSpPr>
@@ -22200,7 +22596,7 @@
       </p:sp>
       <p:sp>
         <p:nvSpPr>
-          <p:cNvPr id="481" name="CustomShape 45"/>
+          <p:cNvPr id="486" name="CustomShape 45"/>
           <p:cNvSpPr/>
           <p:nvPr/>
         </p:nvSpPr>
@@ -22280,7 +22676,7 @@
       </p:grpSpPr>
       <p:sp>
         <p:nvSpPr>
-          <p:cNvPr id="482" name="TextShape 1"/>
+          <p:cNvPr id="487" name="TextShape 1"/>
           <p:cNvSpPr txBox="1"/>
           <p:nvPr/>
         </p:nvSpPr>
@@ -22328,7 +22724,7 @@
       </p:sp>
       <p:sp>
         <p:nvSpPr>
-          <p:cNvPr id="483" name="TextShape 2"/>
+          <p:cNvPr id="488" name="TextShape 2"/>
           <p:cNvSpPr txBox="1"/>
           <p:nvPr/>
         </p:nvSpPr>
@@ -22699,7 +23095,7 @@
       </p:grpSpPr>
       <p:sp>
         <p:nvSpPr>
-          <p:cNvPr id="484" name="TextShape 1"/>
+          <p:cNvPr id="489" name="TextShape 1"/>
           <p:cNvSpPr txBox="1"/>
           <p:nvPr/>
         </p:nvSpPr>
@@ -22734,7 +23130,27 @@
                 <a:latin typeface="Arial"/>
                 <a:ea typeface="Verdana"/>
               </a:rPr>
-              <a:t>Documentation</a:t>
+              <a:t>Docu</a:t>
+            </a:r>
+            <a:r>
+              <a:rPr b="0" lang="en-GB" sz="2800" spc="-1" strike="noStrike">
+                <a:solidFill>
+                  <a:srgbClr val="003088"/>
+                </a:solidFill>
+                <a:latin typeface="Arial"/>
+                <a:ea typeface="Verdana"/>
+              </a:rPr>
+              <a:t>ment</a:t>
+            </a:r>
+            <a:r>
+              <a:rPr b="0" lang="en-GB" sz="2800" spc="-1" strike="noStrike">
+                <a:solidFill>
+                  <a:srgbClr val="003088"/>
+                </a:solidFill>
+                <a:latin typeface="Arial"/>
+                <a:ea typeface="Verdana"/>
+              </a:rPr>
+              <a:t>ation</a:t>
             </a:r>
             <a:endParaRPr b="0" lang="en-US" sz="2800" spc="-1" strike="noStrike">
               <a:solidFill>
@@ -22747,7 +23163,7 @@
       </p:sp>
       <p:sp>
         <p:nvSpPr>
-          <p:cNvPr id="485" name="TextShape 2"/>
+          <p:cNvPr id="490" name="TextShape 2"/>
           <p:cNvSpPr txBox="1"/>
           <p:nvPr/>
         </p:nvSpPr>
@@ -22989,7 +23405,7 @@
       </p:sp>
       <p:pic>
         <p:nvPicPr>
-          <p:cNvPr id="486" name="Picture 7" descr=""/>
+          <p:cNvPr id="491" name="Picture 7" descr=""/>
           <p:cNvPicPr/>
           <p:nvPr/>
         </p:nvPicPr>
@@ -23042,7 +23458,7 @@
       </p:grpSpPr>
       <p:sp>
         <p:nvSpPr>
-          <p:cNvPr id="487" name="TextShape 1"/>
+          <p:cNvPr id="492" name="TextShape 1"/>
           <p:cNvSpPr txBox="1"/>
           <p:nvPr/>
         </p:nvSpPr>
@@ -23090,7 +23506,7 @@
       </p:sp>
       <p:sp>
         <p:nvSpPr>
-          <p:cNvPr id="488" name="TextShape 2"/>
+          <p:cNvPr id="493" name="TextShape 2"/>
           <p:cNvSpPr txBox="1"/>
           <p:nvPr/>
         </p:nvSpPr>
@@ -23348,7 +23764,7 @@
       </p:sp>
       <p:pic>
         <p:nvPicPr>
-          <p:cNvPr id="489" name="Picture Placeholder 6" descr="A screenshot of a computer&#10;&#10;Description automatically generated"/>
+          <p:cNvPr id="494" name="Picture Placeholder 6" descr="A screenshot of a computer&#10;&#10;Description automatically generated"/>
           <p:cNvPicPr/>
           <p:nvPr/>
         </p:nvPicPr>
@@ -23807,7 +24223,7 @@
       </p:grpSpPr>
       <p:sp>
         <p:nvSpPr>
-          <p:cNvPr id="490" name="TextShape 1"/>
+          <p:cNvPr id="495" name="TextShape 1"/>
           <p:cNvSpPr txBox="1"/>
           <p:nvPr/>
         </p:nvSpPr>
@@ -23855,7 +24271,7 @@
       </p:sp>
       <p:sp>
         <p:nvSpPr>
-          <p:cNvPr id="491" name="TextShape 2"/>
+          <p:cNvPr id="496" name="TextShape 2"/>
           <p:cNvSpPr txBox="1"/>
           <p:nvPr/>
         </p:nvSpPr>
@@ -24174,7 +24590,7 @@
       </p:grpSpPr>
       <p:sp>
         <p:nvSpPr>
-          <p:cNvPr id="492" name="TextShape 1"/>
+          <p:cNvPr id="497" name="TextShape 1"/>
           <p:cNvSpPr txBox="1"/>
           <p:nvPr/>
         </p:nvSpPr>
@@ -26048,7 +26464,57 @@
                 <a:latin typeface="Arial"/>
                 <a:ea typeface="Verdana"/>
               </a:rPr>
-              <a:t>Adding elements</a:t>
+              <a:t>Ad</a:t>
+            </a:r>
+            <a:r>
+              <a:rPr b="0" lang="en-US" sz="2800" spc="-1" strike="noStrike">
+                <a:solidFill>
+                  <a:srgbClr val="003088"/>
+                </a:solidFill>
+                <a:latin typeface="Arial"/>
+                <a:ea typeface="Verdana"/>
+              </a:rPr>
+              <a:t>din</a:t>
+            </a:r>
+            <a:r>
+              <a:rPr b="0" lang="en-US" sz="2800" spc="-1" strike="noStrike">
+                <a:solidFill>
+                  <a:srgbClr val="003088"/>
+                </a:solidFill>
+                <a:latin typeface="Arial"/>
+                <a:ea typeface="Verdana"/>
+              </a:rPr>
+              <a:t>g </a:t>
+            </a:r>
+            <a:r>
+              <a:rPr b="0" lang="en-US" sz="2800" spc="-1" strike="noStrike">
+                <a:solidFill>
+                  <a:srgbClr val="003088"/>
+                </a:solidFill>
+                <a:latin typeface="Arial"/>
+                <a:ea typeface="Verdana"/>
+              </a:rPr>
+              <a:t>ele</a:t>
+            </a:r>
+            <a:r>
+              <a:rPr b="0" lang="en-US" sz="2800" spc="-1" strike="noStrike">
+                <a:solidFill>
+                  <a:srgbClr val="003088"/>
+                </a:solidFill>
+                <a:latin typeface="Arial"/>
+                <a:ea typeface="Verdana"/>
+              </a:rPr>
+              <a:t>me</a:t>
+            </a:r>
+            <a:r>
+              <a:rPr b="0" lang="en-US" sz="2800" spc="-1" strike="noStrike">
+                <a:solidFill>
+                  <a:srgbClr val="003088"/>
+                </a:solidFill>
+                <a:latin typeface="Arial"/>
+                <a:ea typeface="Verdana"/>
+              </a:rPr>
+              <a:t>nts</a:t>
             </a:r>
             <a:endParaRPr b="0" lang="en-US" sz="2800" spc="-1" strike="noStrike">
               <a:solidFill>
@@ -26347,7 +26813,17 @@
                 <a:latin typeface="Arial"/>
                 <a:ea typeface="Verdana"/>
               </a:rPr>
-              <a:t>Validation</a:t>
+              <a:t>Validat</a:t>
+            </a:r>
+            <a:r>
+              <a:rPr b="0" lang="en-US" sz="2800" spc="-1" strike="noStrike">
+                <a:solidFill>
+                  <a:srgbClr val="003088"/>
+                </a:solidFill>
+                <a:latin typeface="Arial"/>
+                <a:ea typeface="Verdana"/>
+              </a:rPr>
+              <a:t>ion</a:t>
             </a:r>
             <a:endParaRPr b="0" lang="en-US" sz="2800" spc="-1" strike="noStrike">
               <a:solidFill>

</xml_diff>